<commit_message>
grid and numbers oddball
</commit_message>
<xml_diff>
--- a/instructions/instruction_slides.pptx
+++ b/instructions/instruction_slides.pptx
@@ -11,7 +11,7 @@
     <p:sldId id="256" r:id="rId5"/>
     <p:sldId id="285" r:id="rId6"/>
     <p:sldId id="283" r:id="rId7"/>
-    <p:sldId id="284" r:id="rId8"/>
+    <p:sldId id="286" r:id="rId8"/>
   </p:sldIdLst>
   <p:sldSz cx="12192000" cy="6858000"/>
   <p:notesSz cx="6858000" cy="9144000"/>
@@ -121,7 +121,7 @@
             <p14:sldId id="256"/>
             <p14:sldId id="285"/>
             <p14:sldId id="283"/>
-            <p14:sldId id="284"/>
+            <p14:sldId id="286"/>
           </p14:sldIdLst>
         </p14:section>
       </p14:sectionLst>
@@ -282,7 +282,7 @@
           <a:p>
             <a:fld id="{720A8C9A-4914-4E30-BB53-2E47D8B0250F}" type="datetimeFigureOut">
               <a:rPr lang="en-GB" smtClean="0"/>
-              <a:t>27/02/2025</a:t>
+              <a:t>30/04/2025</a:t>
             </a:fld>
             <a:endParaRPr lang="en-GB"/>
           </a:p>
@@ -482,7 +482,7 @@
           <a:p>
             <a:fld id="{720A8C9A-4914-4E30-BB53-2E47D8B0250F}" type="datetimeFigureOut">
               <a:rPr lang="en-GB" smtClean="0"/>
-              <a:t>27/02/2025</a:t>
+              <a:t>30/04/2025</a:t>
             </a:fld>
             <a:endParaRPr lang="en-GB"/>
           </a:p>
@@ -692,7 +692,7 @@
           <a:p>
             <a:fld id="{720A8C9A-4914-4E30-BB53-2E47D8B0250F}" type="datetimeFigureOut">
               <a:rPr lang="en-GB" smtClean="0"/>
-              <a:t>27/02/2025</a:t>
+              <a:t>30/04/2025</a:t>
             </a:fld>
             <a:endParaRPr lang="en-GB"/>
           </a:p>
@@ -892,7 +892,7 @@
           <a:p>
             <a:fld id="{720A8C9A-4914-4E30-BB53-2E47D8B0250F}" type="datetimeFigureOut">
               <a:rPr lang="en-GB" smtClean="0"/>
-              <a:t>27/02/2025</a:t>
+              <a:t>30/04/2025</a:t>
             </a:fld>
             <a:endParaRPr lang="en-GB"/>
           </a:p>
@@ -1168,7 +1168,7 @@
           <a:p>
             <a:fld id="{720A8C9A-4914-4E30-BB53-2E47D8B0250F}" type="datetimeFigureOut">
               <a:rPr lang="en-GB" smtClean="0"/>
-              <a:t>27/02/2025</a:t>
+              <a:t>30/04/2025</a:t>
             </a:fld>
             <a:endParaRPr lang="en-GB"/>
           </a:p>
@@ -1436,7 +1436,7 @@
           <a:p>
             <a:fld id="{720A8C9A-4914-4E30-BB53-2E47D8B0250F}" type="datetimeFigureOut">
               <a:rPr lang="en-GB" smtClean="0"/>
-              <a:t>27/02/2025</a:t>
+              <a:t>30/04/2025</a:t>
             </a:fld>
             <a:endParaRPr lang="en-GB"/>
           </a:p>
@@ -1851,7 +1851,7 @@
           <a:p>
             <a:fld id="{720A8C9A-4914-4E30-BB53-2E47D8B0250F}" type="datetimeFigureOut">
               <a:rPr lang="en-GB" smtClean="0"/>
-              <a:t>27/02/2025</a:t>
+              <a:t>30/04/2025</a:t>
             </a:fld>
             <a:endParaRPr lang="en-GB"/>
           </a:p>
@@ -1993,7 +1993,7 @@
           <a:p>
             <a:fld id="{720A8C9A-4914-4E30-BB53-2E47D8B0250F}" type="datetimeFigureOut">
               <a:rPr lang="en-GB" smtClean="0"/>
-              <a:t>27/02/2025</a:t>
+              <a:t>30/04/2025</a:t>
             </a:fld>
             <a:endParaRPr lang="en-GB"/>
           </a:p>
@@ -2106,7 +2106,7 @@
           <a:p>
             <a:fld id="{720A8C9A-4914-4E30-BB53-2E47D8B0250F}" type="datetimeFigureOut">
               <a:rPr lang="en-GB" smtClean="0"/>
-              <a:t>27/02/2025</a:t>
+              <a:t>30/04/2025</a:t>
             </a:fld>
             <a:endParaRPr lang="en-GB"/>
           </a:p>
@@ -2419,7 +2419,7 @@
           <a:p>
             <a:fld id="{720A8C9A-4914-4E30-BB53-2E47D8B0250F}" type="datetimeFigureOut">
               <a:rPr lang="en-GB" smtClean="0"/>
-              <a:t>27/02/2025</a:t>
+              <a:t>30/04/2025</a:t>
             </a:fld>
             <a:endParaRPr lang="en-GB"/>
           </a:p>
@@ -2708,7 +2708,7 @@
           <a:p>
             <a:fld id="{720A8C9A-4914-4E30-BB53-2E47D8B0250F}" type="datetimeFigureOut">
               <a:rPr lang="en-GB" smtClean="0"/>
-              <a:t>27/02/2025</a:t>
+              <a:t>30/04/2025</a:t>
             </a:fld>
             <a:endParaRPr lang="en-GB"/>
           </a:p>
@@ -2951,7 +2951,7 @@
           <a:p>
             <a:fld id="{720A8C9A-4914-4E30-BB53-2E47D8B0250F}" type="datetimeFigureOut">
               <a:rPr lang="en-GB" smtClean="0"/>
-              <a:t>27/02/2025</a:t>
+              <a:t>30/04/2025</a:t>
             </a:fld>
             <a:endParaRPr lang="en-GB"/>
           </a:p>
@@ -4013,15 +4013,7 @@
             </a:r>
             <a:r>
               <a:rPr lang="en-GB" sz="2200" dirty="0" err="1"/>
-              <a:t>Buchstaben</a:t>
-            </a:r>
-            <a:r>
-              <a:rPr lang="en-GB" sz="2200" dirty="0"/>
-              <a:t> / </a:t>
-            </a:r>
-            <a:r>
-              <a:rPr lang="en-GB" sz="2200" dirty="0" err="1"/>
-              <a:t>Bildern</a:t>
+              <a:t>Zahlen</a:t>
             </a:r>
             <a:r>
               <a:rPr lang="en-GB" sz="2200" dirty="0"/>
@@ -4053,7 +4045,7 @@
             </a:r>
             <a:r>
               <a:rPr lang="en-GB" sz="2200" dirty="0" err="1"/>
-              <a:t>Buchstaben</a:t>
+              <a:t>Zahlen</a:t>
             </a:r>
             <a:r>
               <a:rPr lang="en-GB" sz="2200" dirty="0"/>
@@ -4069,19 +4061,19 @@
             </a:r>
             <a:r>
               <a:rPr lang="en-GB" sz="2200" dirty="0" err="1"/>
-              <a:t>ein</a:t>
-            </a:r>
-            <a:r>
-              <a:rPr lang="en-GB" sz="2200" dirty="0"/>
-              <a:t> “O” und manche </a:t>
+              <a:t>eine</a:t>
+            </a:r>
+            <a:r>
+              <a:rPr lang="en-GB" sz="2200" dirty="0"/>
+              <a:t> “7” und manche </a:t>
             </a:r>
             <a:r>
               <a:rPr lang="en-GB" sz="2200" dirty="0" err="1"/>
-              <a:t>ein</a:t>
-            </a:r>
-            <a:r>
-              <a:rPr lang="en-GB" sz="2200" dirty="0"/>
-              <a:t> “X”. </a:t>
+              <a:t>eine</a:t>
+            </a:r>
+            <a:r>
+              <a:rPr lang="en-GB" sz="2200" dirty="0"/>
+              <a:t> “8”. </a:t>
             </a:r>
             <a:r>
               <a:rPr lang="en-GB" sz="2200" dirty="0" err="1"/>
@@ -4105,7 +4097,7 @@
             </a:r>
             <a:r>
               <a:rPr lang="en-GB" sz="2200" dirty="0"/>
-              <a:t> “X” </a:t>
+              <a:t> “7” </a:t>
             </a:r>
             <a:r>
               <a:rPr lang="en-GB" sz="2200" dirty="0" err="1"/>
@@ -4313,7 +4305,7 @@
               <a:pPr algn="ctr"/>
               <a:r>
                 <a:rPr lang="en-GB" sz="2500" dirty="0"/>
-                <a:t>O</a:t>
+                <a:t>8</a:t>
               </a:r>
             </a:p>
           </p:txBody>
@@ -4416,7 +4408,7 @@
               <a:pPr algn="ctr"/>
               <a:r>
                 <a:rPr lang="en-GB" sz="2500" dirty="0"/>
-                <a:t>X</a:t>
+                <a:t>7</a:t>
               </a:r>
             </a:p>
           </p:txBody>
@@ -4519,7 +4511,7 @@
               <a:pPr algn="ctr"/>
               <a:r>
                 <a:rPr lang="en-GB" sz="2500" dirty="0"/>
-                <a:t>O</a:t>
+                <a:t>8</a:t>
               </a:r>
             </a:p>
           </p:txBody>
@@ -4622,7 +4614,7 @@
               <a:pPr algn="ctr"/>
               <a:r>
                 <a:rPr lang="en-GB" sz="2500" dirty="0"/>
-                <a:t>O</a:t>
+                <a:t>8</a:t>
               </a:r>
             </a:p>
           </p:txBody>
@@ -4725,7 +4717,7 @@
               <a:pPr algn="ctr"/>
               <a:r>
                 <a:rPr lang="en-GB" sz="2500" dirty="0"/>
-                <a:t>X</a:t>
+                <a:t>7</a:t>
               </a:r>
             </a:p>
           </p:txBody>
@@ -4883,7 +4875,7 @@
               </a:r>
               <a:r>
                 <a:rPr lang="en-GB" sz="2500" dirty="0"/>
-                <a:t> “X” </a:t>
+                <a:t> “7” </a:t>
               </a:r>
               <a:r>
                 <a:rPr lang="en-GB" sz="2500" dirty="0" err="1"/>
@@ -4980,6 +4972,786 @@
           </a:p>
         </p:txBody>
       </p:sp>
+      <p:cxnSp>
+        <p:nvCxnSpPr>
+          <p:cNvPr id="25" name="Gerader Verbinder 17">
+            <a:extLst>
+              <a:ext uri="{FF2B5EF4-FFF2-40B4-BE49-F238E27FC236}">
+                <a16:creationId xmlns:a16="http://schemas.microsoft.com/office/drawing/2014/main" id="{E07BAC79-659D-49FB-BC79-EC44A8597DD4}"/>
+              </a:ext>
+            </a:extLst>
+          </p:cNvPr>
+          <p:cNvCxnSpPr>
+            <a:cxnSpLocks/>
+          </p:cNvCxnSpPr>
+          <p:nvPr/>
+        </p:nvCxnSpPr>
+        <p:spPr>
+          <a:xfrm>
+            <a:off x="1903959" y="3273286"/>
+            <a:ext cx="0" cy="1260000"/>
+          </a:xfrm>
+          <a:prstGeom prst="line">
+            <a:avLst/>
+          </a:prstGeom>
+          <a:ln w="28575"/>
+        </p:spPr>
+        <p:style>
+          <a:lnRef idx="1">
+            <a:schemeClr val="dk1"/>
+          </a:lnRef>
+          <a:fillRef idx="0">
+            <a:schemeClr val="dk1"/>
+          </a:fillRef>
+          <a:effectRef idx="0">
+            <a:schemeClr val="dk1"/>
+          </a:effectRef>
+          <a:fontRef idx="minor">
+            <a:schemeClr val="tx1"/>
+          </a:fontRef>
+        </p:style>
+      </p:cxnSp>
+      <p:cxnSp>
+        <p:nvCxnSpPr>
+          <p:cNvPr id="26" name="Gerader Verbinder 18">
+            <a:extLst>
+              <a:ext uri="{FF2B5EF4-FFF2-40B4-BE49-F238E27FC236}">
+                <a16:creationId xmlns:a16="http://schemas.microsoft.com/office/drawing/2014/main" id="{3661CB34-D96C-41BE-AE2B-ED3B53C1AC58}"/>
+              </a:ext>
+            </a:extLst>
+          </p:cNvPr>
+          <p:cNvCxnSpPr>
+            <a:cxnSpLocks/>
+          </p:cNvCxnSpPr>
+          <p:nvPr/>
+        </p:nvCxnSpPr>
+        <p:spPr>
+          <a:xfrm>
+            <a:off x="2330040" y="3273286"/>
+            <a:ext cx="0" cy="1260000"/>
+          </a:xfrm>
+          <a:prstGeom prst="line">
+            <a:avLst/>
+          </a:prstGeom>
+          <a:ln w="28575"/>
+        </p:spPr>
+        <p:style>
+          <a:lnRef idx="1">
+            <a:schemeClr val="dk1"/>
+          </a:lnRef>
+          <a:fillRef idx="0">
+            <a:schemeClr val="dk1"/>
+          </a:fillRef>
+          <a:effectRef idx="0">
+            <a:schemeClr val="dk1"/>
+          </a:effectRef>
+          <a:fontRef idx="minor">
+            <a:schemeClr val="tx1"/>
+          </a:fontRef>
+        </p:style>
+      </p:cxnSp>
+      <p:cxnSp>
+        <p:nvCxnSpPr>
+          <p:cNvPr id="27" name="Gerader Verbinder 19">
+            <a:extLst>
+              <a:ext uri="{FF2B5EF4-FFF2-40B4-BE49-F238E27FC236}">
+                <a16:creationId xmlns:a16="http://schemas.microsoft.com/office/drawing/2014/main" id="{D94729C9-182E-45C9-BA1C-5364CE6D9176}"/>
+              </a:ext>
+            </a:extLst>
+          </p:cNvPr>
+          <p:cNvCxnSpPr>
+            <a:cxnSpLocks/>
+          </p:cNvCxnSpPr>
+          <p:nvPr/>
+        </p:nvCxnSpPr>
+        <p:spPr>
+          <a:xfrm>
+            <a:off x="1490003" y="3688178"/>
+            <a:ext cx="1246939" cy="0"/>
+          </a:xfrm>
+          <a:prstGeom prst="line">
+            <a:avLst/>
+          </a:prstGeom>
+          <a:ln w="28575"/>
+        </p:spPr>
+        <p:style>
+          <a:lnRef idx="1">
+            <a:schemeClr val="dk1"/>
+          </a:lnRef>
+          <a:fillRef idx="0">
+            <a:schemeClr val="dk1"/>
+          </a:fillRef>
+          <a:effectRef idx="0">
+            <a:schemeClr val="dk1"/>
+          </a:effectRef>
+          <a:fontRef idx="minor">
+            <a:schemeClr val="tx1"/>
+          </a:fontRef>
+        </p:style>
+      </p:cxnSp>
+      <p:cxnSp>
+        <p:nvCxnSpPr>
+          <p:cNvPr id="28" name="Gerader Verbinder 20">
+            <a:extLst>
+              <a:ext uri="{FF2B5EF4-FFF2-40B4-BE49-F238E27FC236}">
+                <a16:creationId xmlns:a16="http://schemas.microsoft.com/office/drawing/2014/main" id="{D2723D09-0AEE-4498-863B-C4CE24EC1CC3}"/>
+              </a:ext>
+            </a:extLst>
+          </p:cNvPr>
+          <p:cNvCxnSpPr>
+            <a:cxnSpLocks/>
+          </p:cNvCxnSpPr>
+          <p:nvPr/>
+        </p:nvCxnSpPr>
+        <p:spPr>
+          <a:xfrm>
+            <a:off x="1490003" y="4116015"/>
+            <a:ext cx="1246939" cy="0"/>
+          </a:xfrm>
+          <a:prstGeom prst="line">
+            <a:avLst/>
+          </a:prstGeom>
+          <a:ln w="28575"/>
+        </p:spPr>
+        <p:style>
+          <a:lnRef idx="1">
+            <a:schemeClr val="dk1"/>
+          </a:lnRef>
+          <a:fillRef idx="0">
+            <a:schemeClr val="dk1"/>
+          </a:fillRef>
+          <a:effectRef idx="0">
+            <a:schemeClr val="dk1"/>
+          </a:effectRef>
+          <a:fontRef idx="minor">
+            <a:schemeClr val="tx1"/>
+          </a:fontRef>
+        </p:style>
+      </p:cxnSp>
+      <p:cxnSp>
+        <p:nvCxnSpPr>
+          <p:cNvPr id="29" name="Gerader Verbinder 17">
+            <a:extLst>
+              <a:ext uri="{FF2B5EF4-FFF2-40B4-BE49-F238E27FC236}">
+                <a16:creationId xmlns:a16="http://schemas.microsoft.com/office/drawing/2014/main" id="{9E369A1E-6D07-4008-8DF5-C95FDC88CAA6}"/>
+              </a:ext>
+            </a:extLst>
+          </p:cNvPr>
+          <p:cNvCxnSpPr>
+            <a:cxnSpLocks/>
+          </p:cNvCxnSpPr>
+          <p:nvPr/>
+        </p:nvCxnSpPr>
+        <p:spPr>
+          <a:xfrm>
+            <a:off x="3327375" y="3562900"/>
+            <a:ext cx="0" cy="1260000"/>
+          </a:xfrm>
+          <a:prstGeom prst="line">
+            <a:avLst/>
+          </a:prstGeom>
+          <a:ln w="28575"/>
+        </p:spPr>
+        <p:style>
+          <a:lnRef idx="1">
+            <a:schemeClr val="dk1"/>
+          </a:lnRef>
+          <a:fillRef idx="0">
+            <a:schemeClr val="dk1"/>
+          </a:fillRef>
+          <a:effectRef idx="0">
+            <a:schemeClr val="dk1"/>
+          </a:effectRef>
+          <a:fontRef idx="minor">
+            <a:schemeClr val="tx1"/>
+          </a:fontRef>
+        </p:style>
+      </p:cxnSp>
+      <p:cxnSp>
+        <p:nvCxnSpPr>
+          <p:cNvPr id="30" name="Gerader Verbinder 18">
+            <a:extLst>
+              <a:ext uri="{FF2B5EF4-FFF2-40B4-BE49-F238E27FC236}">
+                <a16:creationId xmlns:a16="http://schemas.microsoft.com/office/drawing/2014/main" id="{304000A1-649E-4D30-87E3-298DFEA653FD}"/>
+              </a:ext>
+            </a:extLst>
+          </p:cNvPr>
+          <p:cNvCxnSpPr>
+            <a:cxnSpLocks/>
+          </p:cNvCxnSpPr>
+          <p:nvPr/>
+        </p:nvCxnSpPr>
+        <p:spPr>
+          <a:xfrm>
+            <a:off x="3753456" y="3562900"/>
+            <a:ext cx="0" cy="1260000"/>
+          </a:xfrm>
+          <a:prstGeom prst="line">
+            <a:avLst/>
+          </a:prstGeom>
+          <a:ln w="28575"/>
+        </p:spPr>
+        <p:style>
+          <a:lnRef idx="1">
+            <a:schemeClr val="dk1"/>
+          </a:lnRef>
+          <a:fillRef idx="0">
+            <a:schemeClr val="dk1"/>
+          </a:fillRef>
+          <a:effectRef idx="0">
+            <a:schemeClr val="dk1"/>
+          </a:effectRef>
+          <a:fontRef idx="minor">
+            <a:schemeClr val="tx1"/>
+          </a:fontRef>
+        </p:style>
+      </p:cxnSp>
+      <p:cxnSp>
+        <p:nvCxnSpPr>
+          <p:cNvPr id="31" name="Gerader Verbinder 19">
+            <a:extLst>
+              <a:ext uri="{FF2B5EF4-FFF2-40B4-BE49-F238E27FC236}">
+                <a16:creationId xmlns:a16="http://schemas.microsoft.com/office/drawing/2014/main" id="{009B6D01-4B60-4715-97B0-3E579F053E2A}"/>
+              </a:ext>
+            </a:extLst>
+          </p:cNvPr>
+          <p:cNvCxnSpPr>
+            <a:cxnSpLocks/>
+          </p:cNvCxnSpPr>
+          <p:nvPr/>
+        </p:nvCxnSpPr>
+        <p:spPr>
+          <a:xfrm>
+            <a:off x="2913419" y="3977792"/>
+            <a:ext cx="1246939" cy="0"/>
+          </a:xfrm>
+          <a:prstGeom prst="line">
+            <a:avLst/>
+          </a:prstGeom>
+          <a:ln w="28575"/>
+        </p:spPr>
+        <p:style>
+          <a:lnRef idx="1">
+            <a:schemeClr val="dk1"/>
+          </a:lnRef>
+          <a:fillRef idx="0">
+            <a:schemeClr val="dk1"/>
+          </a:fillRef>
+          <a:effectRef idx="0">
+            <a:schemeClr val="dk1"/>
+          </a:effectRef>
+          <a:fontRef idx="minor">
+            <a:schemeClr val="tx1"/>
+          </a:fontRef>
+        </p:style>
+      </p:cxnSp>
+      <p:cxnSp>
+        <p:nvCxnSpPr>
+          <p:cNvPr id="32" name="Gerader Verbinder 20">
+            <a:extLst>
+              <a:ext uri="{FF2B5EF4-FFF2-40B4-BE49-F238E27FC236}">
+                <a16:creationId xmlns:a16="http://schemas.microsoft.com/office/drawing/2014/main" id="{18563FFA-EB9E-4EB4-B605-15D18E58B4AF}"/>
+              </a:ext>
+            </a:extLst>
+          </p:cNvPr>
+          <p:cNvCxnSpPr>
+            <a:cxnSpLocks/>
+          </p:cNvCxnSpPr>
+          <p:nvPr/>
+        </p:nvCxnSpPr>
+        <p:spPr>
+          <a:xfrm>
+            <a:off x="2913419" y="4405629"/>
+            <a:ext cx="1246939" cy="0"/>
+          </a:xfrm>
+          <a:prstGeom prst="line">
+            <a:avLst/>
+          </a:prstGeom>
+          <a:ln w="28575"/>
+        </p:spPr>
+        <p:style>
+          <a:lnRef idx="1">
+            <a:schemeClr val="dk1"/>
+          </a:lnRef>
+          <a:fillRef idx="0">
+            <a:schemeClr val="dk1"/>
+          </a:fillRef>
+          <a:effectRef idx="0">
+            <a:schemeClr val="dk1"/>
+          </a:effectRef>
+          <a:fontRef idx="minor">
+            <a:schemeClr val="tx1"/>
+          </a:fontRef>
+        </p:style>
+      </p:cxnSp>
+      <p:cxnSp>
+        <p:nvCxnSpPr>
+          <p:cNvPr id="33" name="Gerader Verbinder 17">
+            <a:extLst>
+              <a:ext uri="{FF2B5EF4-FFF2-40B4-BE49-F238E27FC236}">
+                <a16:creationId xmlns:a16="http://schemas.microsoft.com/office/drawing/2014/main" id="{1F7271E8-6413-44A7-A0DC-B4F9BA6451B5}"/>
+              </a:ext>
+            </a:extLst>
+          </p:cNvPr>
+          <p:cNvCxnSpPr>
+            <a:cxnSpLocks/>
+          </p:cNvCxnSpPr>
+          <p:nvPr/>
+        </p:nvCxnSpPr>
+        <p:spPr>
+          <a:xfrm>
+            <a:off x="4740743" y="3846266"/>
+            <a:ext cx="0" cy="1260000"/>
+          </a:xfrm>
+          <a:prstGeom prst="line">
+            <a:avLst/>
+          </a:prstGeom>
+          <a:ln w="28575"/>
+        </p:spPr>
+        <p:style>
+          <a:lnRef idx="1">
+            <a:schemeClr val="dk1"/>
+          </a:lnRef>
+          <a:fillRef idx="0">
+            <a:schemeClr val="dk1"/>
+          </a:fillRef>
+          <a:effectRef idx="0">
+            <a:schemeClr val="dk1"/>
+          </a:effectRef>
+          <a:fontRef idx="minor">
+            <a:schemeClr val="tx1"/>
+          </a:fontRef>
+        </p:style>
+      </p:cxnSp>
+      <p:cxnSp>
+        <p:nvCxnSpPr>
+          <p:cNvPr id="34" name="Gerader Verbinder 18">
+            <a:extLst>
+              <a:ext uri="{FF2B5EF4-FFF2-40B4-BE49-F238E27FC236}">
+                <a16:creationId xmlns:a16="http://schemas.microsoft.com/office/drawing/2014/main" id="{5E36105F-AA61-4011-BC86-5ABDE1FC70B2}"/>
+              </a:ext>
+            </a:extLst>
+          </p:cNvPr>
+          <p:cNvCxnSpPr>
+            <a:cxnSpLocks/>
+          </p:cNvCxnSpPr>
+          <p:nvPr/>
+        </p:nvCxnSpPr>
+        <p:spPr>
+          <a:xfrm>
+            <a:off x="5166824" y="3846266"/>
+            <a:ext cx="0" cy="1260000"/>
+          </a:xfrm>
+          <a:prstGeom prst="line">
+            <a:avLst/>
+          </a:prstGeom>
+          <a:ln w="28575"/>
+        </p:spPr>
+        <p:style>
+          <a:lnRef idx="1">
+            <a:schemeClr val="dk1"/>
+          </a:lnRef>
+          <a:fillRef idx="0">
+            <a:schemeClr val="dk1"/>
+          </a:fillRef>
+          <a:effectRef idx="0">
+            <a:schemeClr val="dk1"/>
+          </a:effectRef>
+          <a:fontRef idx="minor">
+            <a:schemeClr val="tx1"/>
+          </a:fontRef>
+        </p:style>
+      </p:cxnSp>
+      <p:cxnSp>
+        <p:nvCxnSpPr>
+          <p:cNvPr id="35" name="Gerader Verbinder 19">
+            <a:extLst>
+              <a:ext uri="{FF2B5EF4-FFF2-40B4-BE49-F238E27FC236}">
+                <a16:creationId xmlns:a16="http://schemas.microsoft.com/office/drawing/2014/main" id="{075A0641-EC25-4301-B325-FE7A578ADF9B}"/>
+              </a:ext>
+            </a:extLst>
+          </p:cNvPr>
+          <p:cNvCxnSpPr>
+            <a:cxnSpLocks/>
+          </p:cNvCxnSpPr>
+          <p:nvPr/>
+        </p:nvCxnSpPr>
+        <p:spPr>
+          <a:xfrm>
+            <a:off x="4326787" y="4261158"/>
+            <a:ext cx="1246939" cy="0"/>
+          </a:xfrm>
+          <a:prstGeom prst="line">
+            <a:avLst/>
+          </a:prstGeom>
+          <a:ln w="28575"/>
+        </p:spPr>
+        <p:style>
+          <a:lnRef idx="1">
+            <a:schemeClr val="dk1"/>
+          </a:lnRef>
+          <a:fillRef idx="0">
+            <a:schemeClr val="dk1"/>
+          </a:fillRef>
+          <a:effectRef idx="0">
+            <a:schemeClr val="dk1"/>
+          </a:effectRef>
+          <a:fontRef idx="minor">
+            <a:schemeClr val="tx1"/>
+          </a:fontRef>
+        </p:style>
+      </p:cxnSp>
+      <p:cxnSp>
+        <p:nvCxnSpPr>
+          <p:cNvPr id="36" name="Gerader Verbinder 20">
+            <a:extLst>
+              <a:ext uri="{FF2B5EF4-FFF2-40B4-BE49-F238E27FC236}">
+                <a16:creationId xmlns:a16="http://schemas.microsoft.com/office/drawing/2014/main" id="{3F534248-97AE-4F11-B1ED-72B9D2F94F19}"/>
+              </a:ext>
+            </a:extLst>
+          </p:cNvPr>
+          <p:cNvCxnSpPr>
+            <a:cxnSpLocks/>
+          </p:cNvCxnSpPr>
+          <p:nvPr/>
+        </p:nvCxnSpPr>
+        <p:spPr>
+          <a:xfrm>
+            <a:off x="4326787" y="4688995"/>
+            <a:ext cx="1246939" cy="0"/>
+          </a:xfrm>
+          <a:prstGeom prst="line">
+            <a:avLst/>
+          </a:prstGeom>
+          <a:ln w="28575"/>
+        </p:spPr>
+        <p:style>
+          <a:lnRef idx="1">
+            <a:schemeClr val="dk1"/>
+          </a:lnRef>
+          <a:fillRef idx="0">
+            <a:schemeClr val="dk1"/>
+          </a:fillRef>
+          <a:effectRef idx="0">
+            <a:schemeClr val="dk1"/>
+          </a:effectRef>
+          <a:fontRef idx="minor">
+            <a:schemeClr val="tx1"/>
+          </a:fontRef>
+        </p:style>
+      </p:cxnSp>
+      <p:cxnSp>
+        <p:nvCxnSpPr>
+          <p:cNvPr id="37" name="Gerader Verbinder 17">
+            <a:extLst>
+              <a:ext uri="{FF2B5EF4-FFF2-40B4-BE49-F238E27FC236}">
+                <a16:creationId xmlns:a16="http://schemas.microsoft.com/office/drawing/2014/main" id="{2DA93C3B-8D87-4B91-87C7-A1456595475E}"/>
+              </a:ext>
+            </a:extLst>
+          </p:cNvPr>
+          <p:cNvCxnSpPr>
+            <a:cxnSpLocks/>
+          </p:cNvCxnSpPr>
+          <p:nvPr/>
+        </p:nvCxnSpPr>
+        <p:spPr>
+          <a:xfrm>
+            <a:off x="6139181" y="4116015"/>
+            <a:ext cx="0" cy="1260000"/>
+          </a:xfrm>
+          <a:prstGeom prst="line">
+            <a:avLst/>
+          </a:prstGeom>
+          <a:ln w="28575"/>
+        </p:spPr>
+        <p:style>
+          <a:lnRef idx="1">
+            <a:schemeClr val="dk1"/>
+          </a:lnRef>
+          <a:fillRef idx="0">
+            <a:schemeClr val="dk1"/>
+          </a:fillRef>
+          <a:effectRef idx="0">
+            <a:schemeClr val="dk1"/>
+          </a:effectRef>
+          <a:fontRef idx="minor">
+            <a:schemeClr val="tx1"/>
+          </a:fontRef>
+        </p:style>
+      </p:cxnSp>
+      <p:cxnSp>
+        <p:nvCxnSpPr>
+          <p:cNvPr id="38" name="Gerader Verbinder 18">
+            <a:extLst>
+              <a:ext uri="{FF2B5EF4-FFF2-40B4-BE49-F238E27FC236}">
+                <a16:creationId xmlns:a16="http://schemas.microsoft.com/office/drawing/2014/main" id="{8FFAFC45-C987-4EA9-9A80-29EAD9EAE10D}"/>
+              </a:ext>
+            </a:extLst>
+          </p:cNvPr>
+          <p:cNvCxnSpPr>
+            <a:cxnSpLocks/>
+          </p:cNvCxnSpPr>
+          <p:nvPr/>
+        </p:nvCxnSpPr>
+        <p:spPr>
+          <a:xfrm>
+            <a:off x="6565262" y="4116015"/>
+            <a:ext cx="0" cy="1260000"/>
+          </a:xfrm>
+          <a:prstGeom prst="line">
+            <a:avLst/>
+          </a:prstGeom>
+          <a:ln w="28575"/>
+        </p:spPr>
+        <p:style>
+          <a:lnRef idx="1">
+            <a:schemeClr val="dk1"/>
+          </a:lnRef>
+          <a:fillRef idx="0">
+            <a:schemeClr val="dk1"/>
+          </a:fillRef>
+          <a:effectRef idx="0">
+            <a:schemeClr val="dk1"/>
+          </a:effectRef>
+          <a:fontRef idx="minor">
+            <a:schemeClr val="tx1"/>
+          </a:fontRef>
+        </p:style>
+      </p:cxnSp>
+      <p:cxnSp>
+        <p:nvCxnSpPr>
+          <p:cNvPr id="39" name="Gerader Verbinder 19">
+            <a:extLst>
+              <a:ext uri="{FF2B5EF4-FFF2-40B4-BE49-F238E27FC236}">
+                <a16:creationId xmlns:a16="http://schemas.microsoft.com/office/drawing/2014/main" id="{E62AEFCD-2CC0-438B-9125-9AC2DBCE1A50}"/>
+              </a:ext>
+            </a:extLst>
+          </p:cNvPr>
+          <p:cNvCxnSpPr>
+            <a:cxnSpLocks/>
+          </p:cNvCxnSpPr>
+          <p:nvPr/>
+        </p:nvCxnSpPr>
+        <p:spPr>
+          <a:xfrm>
+            <a:off x="5725225" y="4530907"/>
+            <a:ext cx="1246939" cy="0"/>
+          </a:xfrm>
+          <a:prstGeom prst="line">
+            <a:avLst/>
+          </a:prstGeom>
+          <a:ln w="28575"/>
+        </p:spPr>
+        <p:style>
+          <a:lnRef idx="1">
+            <a:schemeClr val="dk1"/>
+          </a:lnRef>
+          <a:fillRef idx="0">
+            <a:schemeClr val="dk1"/>
+          </a:fillRef>
+          <a:effectRef idx="0">
+            <a:schemeClr val="dk1"/>
+          </a:effectRef>
+          <a:fontRef idx="minor">
+            <a:schemeClr val="tx1"/>
+          </a:fontRef>
+        </p:style>
+      </p:cxnSp>
+      <p:cxnSp>
+        <p:nvCxnSpPr>
+          <p:cNvPr id="40" name="Gerader Verbinder 20">
+            <a:extLst>
+              <a:ext uri="{FF2B5EF4-FFF2-40B4-BE49-F238E27FC236}">
+                <a16:creationId xmlns:a16="http://schemas.microsoft.com/office/drawing/2014/main" id="{529ED704-C932-4BC3-8934-D37607D876FB}"/>
+              </a:ext>
+            </a:extLst>
+          </p:cNvPr>
+          <p:cNvCxnSpPr>
+            <a:cxnSpLocks/>
+          </p:cNvCxnSpPr>
+          <p:nvPr/>
+        </p:nvCxnSpPr>
+        <p:spPr>
+          <a:xfrm>
+            <a:off x="5725225" y="4958744"/>
+            <a:ext cx="1246939" cy="0"/>
+          </a:xfrm>
+          <a:prstGeom prst="line">
+            <a:avLst/>
+          </a:prstGeom>
+          <a:ln w="28575"/>
+        </p:spPr>
+        <p:style>
+          <a:lnRef idx="1">
+            <a:schemeClr val="dk1"/>
+          </a:lnRef>
+          <a:fillRef idx="0">
+            <a:schemeClr val="dk1"/>
+          </a:fillRef>
+          <a:effectRef idx="0">
+            <a:schemeClr val="dk1"/>
+          </a:effectRef>
+          <a:fontRef idx="minor">
+            <a:schemeClr val="tx1"/>
+          </a:fontRef>
+        </p:style>
+      </p:cxnSp>
+      <p:cxnSp>
+        <p:nvCxnSpPr>
+          <p:cNvPr id="41" name="Gerader Verbinder 17">
+            <a:extLst>
+              <a:ext uri="{FF2B5EF4-FFF2-40B4-BE49-F238E27FC236}">
+                <a16:creationId xmlns:a16="http://schemas.microsoft.com/office/drawing/2014/main" id="{F7DADA57-80BE-4507-8BCB-92A0A2A199DB}"/>
+              </a:ext>
+            </a:extLst>
+          </p:cNvPr>
+          <p:cNvCxnSpPr>
+            <a:cxnSpLocks/>
+          </p:cNvCxnSpPr>
+          <p:nvPr/>
+        </p:nvCxnSpPr>
+        <p:spPr>
+          <a:xfrm>
+            <a:off x="7565829" y="4391201"/>
+            <a:ext cx="0" cy="1260000"/>
+          </a:xfrm>
+          <a:prstGeom prst="line">
+            <a:avLst/>
+          </a:prstGeom>
+          <a:ln w="28575"/>
+        </p:spPr>
+        <p:style>
+          <a:lnRef idx="1">
+            <a:schemeClr val="dk1"/>
+          </a:lnRef>
+          <a:fillRef idx="0">
+            <a:schemeClr val="dk1"/>
+          </a:fillRef>
+          <a:effectRef idx="0">
+            <a:schemeClr val="dk1"/>
+          </a:effectRef>
+          <a:fontRef idx="minor">
+            <a:schemeClr val="tx1"/>
+          </a:fontRef>
+        </p:style>
+      </p:cxnSp>
+      <p:cxnSp>
+        <p:nvCxnSpPr>
+          <p:cNvPr id="42" name="Gerader Verbinder 18">
+            <a:extLst>
+              <a:ext uri="{FF2B5EF4-FFF2-40B4-BE49-F238E27FC236}">
+                <a16:creationId xmlns:a16="http://schemas.microsoft.com/office/drawing/2014/main" id="{E1C4958A-5CF8-4603-A959-804D6FD60663}"/>
+              </a:ext>
+            </a:extLst>
+          </p:cNvPr>
+          <p:cNvCxnSpPr>
+            <a:cxnSpLocks/>
+          </p:cNvCxnSpPr>
+          <p:nvPr/>
+        </p:nvCxnSpPr>
+        <p:spPr>
+          <a:xfrm>
+            <a:off x="7991910" y="4391201"/>
+            <a:ext cx="0" cy="1260000"/>
+          </a:xfrm>
+          <a:prstGeom prst="line">
+            <a:avLst/>
+          </a:prstGeom>
+          <a:ln w="28575"/>
+        </p:spPr>
+        <p:style>
+          <a:lnRef idx="1">
+            <a:schemeClr val="dk1"/>
+          </a:lnRef>
+          <a:fillRef idx="0">
+            <a:schemeClr val="dk1"/>
+          </a:fillRef>
+          <a:effectRef idx="0">
+            <a:schemeClr val="dk1"/>
+          </a:effectRef>
+          <a:fontRef idx="minor">
+            <a:schemeClr val="tx1"/>
+          </a:fontRef>
+        </p:style>
+      </p:cxnSp>
+      <p:cxnSp>
+        <p:nvCxnSpPr>
+          <p:cNvPr id="43" name="Gerader Verbinder 19">
+            <a:extLst>
+              <a:ext uri="{FF2B5EF4-FFF2-40B4-BE49-F238E27FC236}">
+                <a16:creationId xmlns:a16="http://schemas.microsoft.com/office/drawing/2014/main" id="{96806178-2C1E-4384-B288-5BBE9EC5B0E0}"/>
+              </a:ext>
+            </a:extLst>
+          </p:cNvPr>
+          <p:cNvCxnSpPr>
+            <a:cxnSpLocks/>
+          </p:cNvCxnSpPr>
+          <p:nvPr/>
+        </p:nvCxnSpPr>
+        <p:spPr>
+          <a:xfrm>
+            <a:off x="7151873" y="4806093"/>
+            <a:ext cx="1246939" cy="0"/>
+          </a:xfrm>
+          <a:prstGeom prst="line">
+            <a:avLst/>
+          </a:prstGeom>
+          <a:ln w="28575"/>
+        </p:spPr>
+        <p:style>
+          <a:lnRef idx="1">
+            <a:schemeClr val="dk1"/>
+          </a:lnRef>
+          <a:fillRef idx="0">
+            <a:schemeClr val="dk1"/>
+          </a:fillRef>
+          <a:effectRef idx="0">
+            <a:schemeClr val="dk1"/>
+          </a:effectRef>
+          <a:fontRef idx="minor">
+            <a:schemeClr val="tx1"/>
+          </a:fontRef>
+        </p:style>
+      </p:cxnSp>
+      <p:cxnSp>
+        <p:nvCxnSpPr>
+          <p:cNvPr id="44" name="Gerader Verbinder 20">
+            <a:extLst>
+              <a:ext uri="{FF2B5EF4-FFF2-40B4-BE49-F238E27FC236}">
+                <a16:creationId xmlns:a16="http://schemas.microsoft.com/office/drawing/2014/main" id="{7C2521E2-D15D-451C-A4B0-6577E68772F0}"/>
+              </a:ext>
+            </a:extLst>
+          </p:cNvPr>
+          <p:cNvCxnSpPr>
+            <a:cxnSpLocks/>
+          </p:cNvCxnSpPr>
+          <p:nvPr/>
+        </p:nvCxnSpPr>
+        <p:spPr>
+          <a:xfrm>
+            <a:off x="7151873" y="5233930"/>
+            <a:ext cx="1246939" cy="0"/>
+          </a:xfrm>
+          <a:prstGeom prst="line">
+            <a:avLst/>
+          </a:prstGeom>
+          <a:ln w="28575"/>
+        </p:spPr>
+        <p:style>
+          <a:lnRef idx="1">
+            <a:schemeClr val="dk1"/>
+          </a:lnRef>
+          <a:fillRef idx="0">
+            <a:schemeClr val="dk1"/>
+          </a:fillRef>
+          <a:effectRef idx="0">
+            <a:schemeClr val="dk1"/>
+          </a:effectRef>
+          <a:fontRef idx="minor">
+            <a:schemeClr val="tx1"/>
+          </a:fontRef>
+        </p:style>
+      </p:cxnSp>
     </p:spTree>
     <p:extLst>
       <p:ext uri="{BB962C8B-B14F-4D97-AF65-F5344CB8AC3E}">
@@ -5372,15 +6144,7 @@
             </a:r>
             <a:r>
               <a:rPr lang="en-GB" sz="2200" dirty="0" err="1"/>
-              <a:t>Buchstaben</a:t>
-            </a:r>
-            <a:r>
-              <a:rPr lang="en-GB" sz="2200" dirty="0"/>
-              <a:t> / </a:t>
-            </a:r>
-            <a:r>
-              <a:rPr lang="en-GB" sz="2200" dirty="0" err="1"/>
-              <a:t>Bildern</a:t>
+              <a:t>Zahlen</a:t>
             </a:r>
             <a:r>
               <a:rPr lang="en-GB" sz="2200" dirty="0"/>
@@ -5412,7 +6176,7 @@
             </a:r>
             <a:r>
               <a:rPr lang="en-GB" sz="2200" dirty="0" err="1"/>
-              <a:t>Buchstaben</a:t>
+              <a:t>Zahlen</a:t>
             </a:r>
             <a:r>
               <a:rPr lang="en-GB" sz="2200" dirty="0"/>
@@ -5428,19 +6192,19 @@
             </a:r>
             <a:r>
               <a:rPr lang="en-GB" sz="2200" dirty="0" err="1"/>
-              <a:t>ein</a:t>
-            </a:r>
-            <a:r>
-              <a:rPr lang="en-GB" sz="2200" dirty="0"/>
-              <a:t> “O” und manche </a:t>
+              <a:t>eine</a:t>
+            </a:r>
+            <a:r>
+              <a:rPr lang="en-GB" sz="2200" dirty="0"/>
+              <a:t> “7” und manche </a:t>
             </a:r>
             <a:r>
               <a:rPr lang="en-GB" sz="2200" dirty="0" err="1"/>
-              <a:t>ein</a:t>
-            </a:r>
-            <a:r>
-              <a:rPr lang="en-GB" sz="2200" dirty="0"/>
-              <a:t> “X”.  </a:t>
+              <a:t>eine</a:t>
+            </a:r>
+            <a:r>
+              <a:rPr lang="en-GB" sz="2200" dirty="0"/>
+              <a:t> “8”. </a:t>
             </a:r>
             <a:r>
               <a:rPr lang="en-GB" sz="2200" dirty="0" err="1"/>
@@ -5456,15 +6220,39 @@
             </a:r>
             <a:r>
               <a:rPr lang="en-GB" sz="2200" dirty="0"/>
-              <a:t> die </a:t>
+              <a:t> , </a:t>
             </a:r>
             <a:r>
               <a:rPr lang="en-GB" sz="2200" dirty="0" err="1"/>
-              <a:t>Anzahl</a:t>
-            </a:r>
-            <a:r>
-              <a:rPr lang="en-GB" sz="2200" dirty="0"/>
-              <a:t> von “X”.</a:t>
+              <a:t>wie</a:t>
+            </a:r>
+            <a:r>
+              <a:rPr lang="en-GB" sz="2200" dirty="0"/>
+              <a:t> </a:t>
+            </a:r>
+            <a:r>
+              <a:rPr lang="en-GB" sz="2200" dirty="0" err="1"/>
+              <a:t>häufig</a:t>
+            </a:r>
+            <a:r>
+              <a:rPr lang="en-GB" sz="2200" dirty="0"/>
+              <a:t> “7” </a:t>
+            </a:r>
+            <a:r>
+              <a:rPr lang="en-GB" sz="2200" dirty="0" err="1"/>
+              <a:t>aufgetreten</a:t>
+            </a:r>
+            <a:r>
+              <a:rPr lang="en-GB" sz="2200" dirty="0"/>
+              <a:t> </a:t>
+            </a:r>
+            <a:r>
+              <a:rPr lang="en-GB" sz="2200" dirty="0" err="1"/>
+              <a:t>ist</a:t>
+            </a:r>
+            <a:r>
+              <a:rPr lang="en-GB" sz="2200" dirty="0"/>
+              <a:t>.</a:t>
             </a:r>
           </a:p>
           <a:p>
@@ -5497,7 +6285,7 @@
             </a:r>
             <a:r>
               <a:rPr lang="en-GB" sz="2200" dirty="0" err="1"/>
-              <a:t>ein</a:t>
+              <a:t>eine</a:t>
             </a:r>
             <a:r>
               <a:rPr lang="en-GB" sz="2200" dirty="0"/>
@@ -5505,7 +6293,7 @@
             </a:r>
             <a:r>
               <a:rPr lang="en-GB" sz="2200" b="1" dirty="0"/>
-              <a:t>“X”</a:t>
+              <a:t>“7”</a:t>
             </a:r>
             <a:r>
               <a:rPr lang="en-GB" sz="2200" dirty="0"/>
@@ -5537,7 +6325,7 @@
             </a:r>
             <a:r>
               <a:rPr lang="en-GB" sz="2200" dirty="0" err="1"/>
-              <a:t>ein</a:t>
+              <a:t>eine</a:t>
             </a:r>
             <a:r>
               <a:rPr lang="en-GB" sz="2200" dirty="0"/>
@@ -5545,7 +6333,7 @@
             </a:r>
             <a:r>
               <a:rPr lang="en-GB" sz="2200" b="1" dirty="0"/>
-              <a:t>“O”</a:t>
+              <a:t>“8”</a:t>
             </a:r>
             <a:r>
               <a:rPr lang="en-GB" sz="2200" dirty="0"/>
@@ -5752,7 +6540,7 @@
               <a:pPr algn="ctr"/>
               <a:r>
                 <a:rPr lang="en-GB" sz="2500" dirty="0"/>
-                <a:t>O</a:t>
+                <a:t>8</a:t>
               </a:r>
             </a:p>
           </p:txBody>
@@ -5855,7 +6643,7 @@
               <a:pPr algn="ctr"/>
               <a:r>
                 <a:rPr lang="en-GB" sz="2500" dirty="0"/>
-                <a:t>X</a:t>
+                <a:t>7</a:t>
               </a:r>
             </a:p>
           </p:txBody>
@@ -5958,7 +6746,7 @@
               <a:pPr algn="ctr"/>
               <a:r>
                 <a:rPr lang="en-GB" sz="2500" dirty="0"/>
-                <a:t>O</a:t>
+                <a:t>8</a:t>
               </a:r>
             </a:p>
           </p:txBody>
@@ -6061,7 +6849,7 @@
               <a:pPr algn="ctr"/>
               <a:r>
                 <a:rPr lang="en-GB" sz="2500" dirty="0"/>
-                <a:t>O</a:t>
+                <a:t>8</a:t>
               </a:r>
             </a:p>
           </p:txBody>
@@ -6164,7 +6952,7 @@
               <a:pPr algn="ctr"/>
               <a:r>
                 <a:rPr lang="en-GB" sz="2500" dirty="0"/>
-                <a:t>X</a:t>
+                <a:t>7</a:t>
               </a:r>
             </a:p>
           </p:txBody>
@@ -6322,7 +7110,7 @@
               </a:r>
               <a:r>
                 <a:rPr lang="en-GB" sz="2500" dirty="0"/>
-                <a:t> “X” </a:t>
+                <a:t> “7” </a:t>
               </a:r>
               <a:r>
                 <a:rPr lang="en-GB" sz="2500" dirty="0" err="1"/>
@@ -6449,7 +7237,7 @@
           <a:p>
             <a:r>
               <a:rPr lang="en-GB" b="1" dirty="0"/>
-              <a:t>“O” -&gt; </a:t>
+              <a:t>“8” -&gt; </a:t>
             </a:r>
             <a:r>
               <a:rPr lang="en-GB" b="1" dirty="0" err="1"/>
@@ -6489,7 +7277,7 @@
           <a:p>
             <a:r>
               <a:rPr lang="en-GB" b="1" dirty="0"/>
-              <a:t>“O” -&gt; </a:t>
+              <a:t>“8” -&gt; </a:t>
             </a:r>
             <a:r>
               <a:rPr lang="en-GB" b="1" dirty="0" err="1"/>
@@ -6529,7 +7317,7 @@
           <a:p>
             <a:r>
               <a:rPr lang="en-GB" b="1" dirty="0"/>
-              <a:t>“X” -&gt; links</a:t>
+              <a:t>“7” -&gt; links</a:t>
             </a:r>
           </a:p>
         </p:txBody>
@@ -6564,7 +7352,7 @@
           <a:p>
             <a:r>
               <a:rPr lang="en-GB" b="1" dirty="0"/>
-              <a:t>“X” -&gt; links</a:t>
+              <a:t>“7” -&gt; links</a:t>
             </a:r>
           </a:p>
         </p:txBody>
@@ -6599,7 +7387,7 @@
           <a:p>
             <a:r>
               <a:rPr lang="en-GB" b="1" dirty="0"/>
-              <a:t>“O” -&gt; </a:t>
+              <a:t>“8” -&gt; </a:t>
             </a:r>
             <a:r>
               <a:rPr lang="en-GB" b="1" dirty="0" err="1"/>
@@ -6609,6 +7397,1016 @@
           </a:p>
         </p:txBody>
       </p:sp>
+      <p:sp>
+        <p:nvSpPr>
+          <p:cNvPr id="31" name="Rechteck 16">
+            <a:extLst>
+              <a:ext uri="{FF2B5EF4-FFF2-40B4-BE49-F238E27FC236}">
+                <a16:creationId xmlns:a16="http://schemas.microsoft.com/office/drawing/2014/main" id="{63CC5F48-A447-4B7F-9541-14E49613F314}"/>
+              </a:ext>
+            </a:extLst>
+          </p:cNvPr>
+          <p:cNvSpPr/>
+          <p:nvPr/>
+        </p:nvSpPr>
+        <p:spPr>
+          <a:xfrm>
+            <a:off x="1490003" y="3287561"/>
+            <a:ext cx="1246939" cy="1260000"/>
+          </a:xfrm>
+          <a:prstGeom prst="rect">
+            <a:avLst/>
+          </a:prstGeom>
+          <a:noFill/>
+          <a:ln w="28575"/>
+        </p:spPr>
+        <p:style>
+          <a:lnRef idx="2">
+            <a:schemeClr val="dk1"/>
+          </a:lnRef>
+          <a:fillRef idx="1">
+            <a:schemeClr val="lt1"/>
+          </a:fillRef>
+          <a:effectRef idx="0">
+            <a:schemeClr val="dk1"/>
+          </a:effectRef>
+          <a:fontRef idx="minor">
+            <a:schemeClr val="dk1"/>
+          </a:fontRef>
+        </p:style>
+        <p:txBody>
+          <a:bodyPr rtlCol="0" anchor="ctr"/>
+          <a:lstStyle/>
+          <a:p>
+            <a:pPr algn="ctr"/>
+            <a:endParaRPr lang="de-DE" dirty="0"/>
+          </a:p>
+        </p:txBody>
+      </p:sp>
+      <p:sp>
+        <p:nvSpPr>
+          <p:cNvPr id="34" name="Rechteck 16">
+            <a:extLst>
+              <a:ext uri="{FF2B5EF4-FFF2-40B4-BE49-F238E27FC236}">
+                <a16:creationId xmlns:a16="http://schemas.microsoft.com/office/drawing/2014/main" id="{C093C49A-6D7D-4EA3-AD58-4C1EE7675310}"/>
+              </a:ext>
+            </a:extLst>
+          </p:cNvPr>
+          <p:cNvSpPr/>
+          <p:nvPr/>
+        </p:nvSpPr>
+        <p:spPr>
+          <a:xfrm>
+            <a:off x="4326787" y="3834233"/>
+            <a:ext cx="1246939" cy="1260000"/>
+          </a:xfrm>
+          <a:prstGeom prst="rect">
+            <a:avLst/>
+          </a:prstGeom>
+          <a:noFill/>
+          <a:ln w="28575"/>
+        </p:spPr>
+        <p:style>
+          <a:lnRef idx="2">
+            <a:schemeClr val="dk1"/>
+          </a:lnRef>
+          <a:fillRef idx="1">
+            <a:schemeClr val="lt1"/>
+          </a:fillRef>
+          <a:effectRef idx="0">
+            <a:schemeClr val="dk1"/>
+          </a:effectRef>
+          <a:fontRef idx="minor">
+            <a:schemeClr val="dk1"/>
+          </a:fontRef>
+        </p:style>
+        <p:txBody>
+          <a:bodyPr rtlCol="0" anchor="ctr"/>
+          <a:lstStyle/>
+          <a:p>
+            <a:pPr algn="ctr"/>
+            <a:endParaRPr lang="de-DE" dirty="0"/>
+          </a:p>
+        </p:txBody>
+      </p:sp>
+      <p:sp>
+        <p:nvSpPr>
+          <p:cNvPr id="37" name="Rechteck 16">
+            <a:extLst>
+              <a:ext uri="{FF2B5EF4-FFF2-40B4-BE49-F238E27FC236}">
+                <a16:creationId xmlns:a16="http://schemas.microsoft.com/office/drawing/2014/main" id="{AD93F5FA-83A9-425A-B82C-28B70E7248C9}"/>
+              </a:ext>
+            </a:extLst>
+          </p:cNvPr>
+          <p:cNvSpPr/>
+          <p:nvPr/>
+        </p:nvSpPr>
+        <p:spPr>
+          <a:xfrm>
+            <a:off x="2908395" y="3560897"/>
+            <a:ext cx="1246939" cy="1260000"/>
+          </a:xfrm>
+          <a:prstGeom prst="rect">
+            <a:avLst/>
+          </a:prstGeom>
+          <a:noFill/>
+          <a:ln w="28575"/>
+        </p:spPr>
+        <p:style>
+          <a:lnRef idx="2">
+            <a:schemeClr val="dk1"/>
+          </a:lnRef>
+          <a:fillRef idx="1">
+            <a:schemeClr val="lt1"/>
+          </a:fillRef>
+          <a:effectRef idx="0">
+            <a:schemeClr val="dk1"/>
+          </a:effectRef>
+          <a:fontRef idx="minor">
+            <a:schemeClr val="dk1"/>
+          </a:fontRef>
+        </p:style>
+        <p:txBody>
+          <a:bodyPr rtlCol="0" anchor="ctr"/>
+          <a:lstStyle/>
+          <a:p>
+            <a:pPr algn="ctr"/>
+            <a:endParaRPr lang="de-DE" dirty="0"/>
+          </a:p>
+        </p:txBody>
+      </p:sp>
+      <p:sp>
+        <p:nvSpPr>
+          <p:cNvPr id="40" name="Rechteck 16">
+            <a:extLst>
+              <a:ext uri="{FF2B5EF4-FFF2-40B4-BE49-F238E27FC236}">
+                <a16:creationId xmlns:a16="http://schemas.microsoft.com/office/drawing/2014/main" id="{10D1B706-C12B-4B94-A226-C2B5A403F12D}"/>
+              </a:ext>
+            </a:extLst>
+          </p:cNvPr>
+          <p:cNvSpPr/>
+          <p:nvPr/>
+        </p:nvSpPr>
+        <p:spPr>
+          <a:xfrm>
+            <a:off x="5745179" y="4107569"/>
+            <a:ext cx="1246939" cy="1260000"/>
+          </a:xfrm>
+          <a:prstGeom prst="rect">
+            <a:avLst/>
+          </a:prstGeom>
+          <a:noFill/>
+          <a:ln w="28575"/>
+        </p:spPr>
+        <p:style>
+          <a:lnRef idx="2">
+            <a:schemeClr val="dk1"/>
+          </a:lnRef>
+          <a:fillRef idx="1">
+            <a:schemeClr val="lt1"/>
+          </a:fillRef>
+          <a:effectRef idx="0">
+            <a:schemeClr val="dk1"/>
+          </a:effectRef>
+          <a:fontRef idx="minor">
+            <a:schemeClr val="dk1"/>
+          </a:fontRef>
+        </p:style>
+        <p:txBody>
+          <a:bodyPr rtlCol="0" anchor="ctr"/>
+          <a:lstStyle/>
+          <a:p>
+            <a:pPr algn="ctr"/>
+            <a:endParaRPr lang="de-DE" dirty="0"/>
+          </a:p>
+        </p:txBody>
+      </p:sp>
+      <p:sp>
+        <p:nvSpPr>
+          <p:cNvPr id="43" name="Rechteck 16">
+            <a:extLst>
+              <a:ext uri="{FF2B5EF4-FFF2-40B4-BE49-F238E27FC236}">
+                <a16:creationId xmlns:a16="http://schemas.microsoft.com/office/drawing/2014/main" id="{9DE201C6-0675-4E37-A346-BDDECFE4E0D0}"/>
+              </a:ext>
+            </a:extLst>
+          </p:cNvPr>
+          <p:cNvSpPr/>
+          <p:nvPr/>
+        </p:nvSpPr>
+        <p:spPr>
+          <a:xfrm>
+            <a:off x="7163572" y="4380906"/>
+            <a:ext cx="1246939" cy="1260000"/>
+          </a:xfrm>
+          <a:prstGeom prst="rect">
+            <a:avLst/>
+          </a:prstGeom>
+          <a:noFill/>
+          <a:ln w="28575"/>
+        </p:spPr>
+        <p:style>
+          <a:lnRef idx="2">
+            <a:schemeClr val="dk1"/>
+          </a:lnRef>
+          <a:fillRef idx="1">
+            <a:schemeClr val="lt1"/>
+          </a:fillRef>
+          <a:effectRef idx="0">
+            <a:schemeClr val="dk1"/>
+          </a:effectRef>
+          <a:fontRef idx="minor">
+            <a:schemeClr val="dk1"/>
+          </a:fontRef>
+        </p:style>
+        <p:txBody>
+          <a:bodyPr rtlCol="0" anchor="ctr"/>
+          <a:lstStyle/>
+          <a:p>
+            <a:pPr algn="ctr"/>
+            <a:endParaRPr lang="de-DE" dirty="0"/>
+          </a:p>
+        </p:txBody>
+      </p:sp>
+      <p:cxnSp>
+        <p:nvCxnSpPr>
+          <p:cNvPr id="45" name="Gerader Verbinder 17">
+            <a:extLst>
+              <a:ext uri="{FF2B5EF4-FFF2-40B4-BE49-F238E27FC236}">
+                <a16:creationId xmlns:a16="http://schemas.microsoft.com/office/drawing/2014/main" id="{8FCC9CA1-2A1F-473A-ADE5-00C316112BEE}"/>
+              </a:ext>
+            </a:extLst>
+          </p:cNvPr>
+          <p:cNvCxnSpPr>
+            <a:cxnSpLocks/>
+          </p:cNvCxnSpPr>
+          <p:nvPr/>
+        </p:nvCxnSpPr>
+        <p:spPr>
+          <a:xfrm>
+            <a:off x="1903959" y="3273286"/>
+            <a:ext cx="0" cy="1260000"/>
+          </a:xfrm>
+          <a:prstGeom prst="line">
+            <a:avLst/>
+          </a:prstGeom>
+          <a:ln w="28575"/>
+        </p:spPr>
+        <p:style>
+          <a:lnRef idx="1">
+            <a:schemeClr val="dk1"/>
+          </a:lnRef>
+          <a:fillRef idx="0">
+            <a:schemeClr val="dk1"/>
+          </a:fillRef>
+          <a:effectRef idx="0">
+            <a:schemeClr val="dk1"/>
+          </a:effectRef>
+          <a:fontRef idx="minor">
+            <a:schemeClr val="tx1"/>
+          </a:fontRef>
+        </p:style>
+      </p:cxnSp>
+      <p:cxnSp>
+        <p:nvCxnSpPr>
+          <p:cNvPr id="46" name="Gerader Verbinder 18">
+            <a:extLst>
+              <a:ext uri="{FF2B5EF4-FFF2-40B4-BE49-F238E27FC236}">
+                <a16:creationId xmlns:a16="http://schemas.microsoft.com/office/drawing/2014/main" id="{258B92B0-D95F-46CA-81A8-BC66D3935E5A}"/>
+              </a:ext>
+            </a:extLst>
+          </p:cNvPr>
+          <p:cNvCxnSpPr>
+            <a:cxnSpLocks/>
+          </p:cNvCxnSpPr>
+          <p:nvPr/>
+        </p:nvCxnSpPr>
+        <p:spPr>
+          <a:xfrm>
+            <a:off x="2330040" y="3273286"/>
+            <a:ext cx="0" cy="1260000"/>
+          </a:xfrm>
+          <a:prstGeom prst="line">
+            <a:avLst/>
+          </a:prstGeom>
+          <a:ln w="28575"/>
+        </p:spPr>
+        <p:style>
+          <a:lnRef idx="1">
+            <a:schemeClr val="dk1"/>
+          </a:lnRef>
+          <a:fillRef idx="0">
+            <a:schemeClr val="dk1"/>
+          </a:fillRef>
+          <a:effectRef idx="0">
+            <a:schemeClr val="dk1"/>
+          </a:effectRef>
+          <a:fontRef idx="minor">
+            <a:schemeClr val="tx1"/>
+          </a:fontRef>
+        </p:style>
+      </p:cxnSp>
+      <p:cxnSp>
+        <p:nvCxnSpPr>
+          <p:cNvPr id="47" name="Gerader Verbinder 19">
+            <a:extLst>
+              <a:ext uri="{FF2B5EF4-FFF2-40B4-BE49-F238E27FC236}">
+                <a16:creationId xmlns:a16="http://schemas.microsoft.com/office/drawing/2014/main" id="{045600C7-ED41-4460-9553-9792720E8CB0}"/>
+              </a:ext>
+            </a:extLst>
+          </p:cNvPr>
+          <p:cNvCxnSpPr>
+            <a:cxnSpLocks/>
+          </p:cNvCxnSpPr>
+          <p:nvPr/>
+        </p:nvCxnSpPr>
+        <p:spPr>
+          <a:xfrm>
+            <a:off x="1490003" y="3688178"/>
+            <a:ext cx="1246939" cy="0"/>
+          </a:xfrm>
+          <a:prstGeom prst="line">
+            <a:avLst/>
+          </a:prstGeom>
+          <a:ln w="28575"/>
+        </p:spPr>
+        <p:style>
+          <a:lnRef idx="1">
+            <a:schemeClr val="dk1"/>
+          </a:lnRef>
+          <a:fillRef idx="0">
+            <a:schemeClr val="dk1"/>
+          </a:fillRef>
+          <a:effectRef idx="0">
+            <a:schemeClr val="dk1"/>
+          </a:effectRef>
+          <a:fontRef idx="minor">
+            <a:schemeClr val="tx1"/>
+          </a:fontRef>
+        </p:style>
+      </p:cxnSp>
+      <p:cxnSp>
+        <p:nvCxnSpPr>
+          <p:cNvPr id="48" name="Gerader Verbinder 20">
+            <a:extLst>
+              <a:ext uri="{FF2B5EF4-FFF2-40B4-BE49-F238E27FC236}">
+                <a16:creationId xmlns:a16="http://schemas.microsoft.com/office/drawing/2014/main" id="{2C45E925-8E83-47BD-9DF1-4AA68713FAE4}"/>
+              </a:ext>
+            </a:extLst>
+          </p:cNvPr>
+          <p:cNvCxnSpPr>
+            <a:cxnSpLocks/>
+          </p:cNvCxnSpPr>
+          <p:nvPr/>
+        </p:nvCxnSpPr>
+        <p:spPr>
+          <a:xfrm>
+            <a:off x="1490003" y="4116015"/>
+            <a:ext cx="1246939" cy="0"/>
+          </a:xfrm>
+          <a:prstGeom prst="line">
+            <a:avLst/>
+          </a:prstGeom>
+          <a:ln w="28575"/>
+        </p:spPr>
+        <p:style>
+          <a:lnRef idx="1">
+            <a:schemeClr val="dk1"/>
+          </a:lnRef>
+          <a:fillRef idx="0">
+            <a:schemeClr val="dk1"/>
+          </a:fillRef>
+          <a:effectRef idx="0">
+            <a:schemeClr val="dk1"/>
+          </a:effectRef>
+          <a:fontRef idx="minor">
+            <a:schemeClr val="tx1"/>
+          </a:fontRef>
+        </p:style>
+      </p:cxnSp>
+      <p:cxnSp>
+        <p:nvCxnSpPr>
+          <p:cNvPr id="49" name="Gerader Verbinder 17">
+            <a:extLst>
+              <a:ext uri="{FF2B5EF4-FFF2-40B4-BE49-F238E27FC236}">
+                <a16:creationId xmlns:a16="http://schemas.microsoft.com/office/drawing/2014/main" id="{0F7F8935-BB9D-4412-8616-932D7613AA41}"/>
+              </a:ext>
+            </a:extLst>
+          </p:cNvPr>
+          <p:cNvCxnSpPr>
+            <a:cxnSpLocks/>
+          </p:cNvCxnSpPr>
+          <p:nvPr/>
+        </p:nvCxnSpPr>
+        <p:spPr>
+          <a:xfrm>
+            <a:off x="3327375" y="3562900"/>
+            <a:ext cx="0" cy="1260000"/>
+          </a:xfrm>
+          <a:prstGeom prst="line">
+            <a:avLst/>
+          </a:prstGeom>
+          <a:ln w="28575"/>
+        </p:spPr>
+        <p:style>
+          <a:lnRef idx="1">
+            <a:schemeClr val="dk1"/>
+          </a:lnRef>
+          <a:fillRef idx="0">
+            <a:schemeClr val="dk1"/>
+          </a:fillRef>
+          <a:effectRef idx="0">
+            <a:schemeClr val="dk1"/>
+          </a:effectRef>
+          <a:fontRef idx="minor">
+            <a:schemeClr val="tx1"/>
+          </a:fontRef>
+        </p:style>
+      </p:cxnSp>
+      <p:cxnSp>
+        <p:nvCxnSpPr>
+          <p:cNvPr id="50" name="Gerader Verbinder 18">
+            <a:extLst>
+              <a:ext uri="{FF2B5EF4-FFF2-40B4-BE49-F238E27FC236}">
+                <a16:creationId xmlns:a16="http://schemas.microsoft.com/office/drawing/2014/main" id="{64362855-CE6C-4038-861E-8C0777B69D4F}"/>
+              </a:ext>
+            </a:extLst>
+          </p:cNvPr>
+          <p:cNvCxnSpPr>
+            <a:cxnSpLocks/>
+          </p:cNvCxnSpPr>
+          <p:nvPr/>
+        </p:nvCxnSpPr>
+        <p:spPr>
+          <a:xfrm>
+            <a:off x="3753456" y="3562900"/>
+            <a:ext cx="0" cy="1260000"/>
+          </a:xfrm>
+          <a:prstGeom prst="line">
+            <a:avLst/>
+          </a:prstGeom>
+          <a:ln w="28575"/>
+        </p:spPr>
+        <p:style>
+          <a:lnRef idx="1">
+            <a:schemeClr val="dk1"/>
+          </a:lnRef>
+          <a:fillRef idx="0">
+            <a:schemeClr val="dk1"/>
+          </a:fillRef>
+          <a:effectRef idx="0">
+            <a:schemeClr val="dk1"/>
+          </a:effectRef>
+          <a:fontRef idx="minor">
+            <a:schemeClr val="tx1"/>
+          </a:fontRef>
+        </p:style>
+      </p:cxnSp>
+      <p:cxnSp>
+        <p:nvCxnSpPr>
+          <p:cNvPr id="51" name="Gerader Verbinder 19">
+            <a:extLst>
+              <a:ext uri="{FF2B5EF4-FFF2-40B4-BE49-F238E27FC236}">
+                <a16:creationId xmlns:a16="http://schemas.microsoft.com/office/drawing/2014/main" id="{62271103-EBA2-4889-BA2D-E926E7239163}"/>
+              </a:ext>
+            </a:extLst>
+          </p:cNvPr>
+          <p:cNvCxnSpPr>
+            <a:cxnSpLocks/>
+          </p:cNvCxnSpPr>
+          <p:nvPr/>
+        </p:nvCxnSpPr>
+        <p:spPr>
+          <a:xfrm>
+            <a:off x="2913419" y="3977792"/>
+            <a:ext cx="1246939" cy="0"/>
+          </a:xfrm>
+          <a:prstGeom prst="line">
+            <a:avLst/>
+          </a:prstGeom>
+          <a:ln w="28575"/>
+        </p:spPr>
+        <p:style>
+          <a:lnRef idx="1">
+            <a:schemeClr val="dk1"/>
+          </a:lnRef>
+          <a:fillRef idx="0">
+            <a:schemeClr val="dk1"/>
+          </a:fillRef>
+          <a:effectRef idx="0">
+            <a:schemeClr val="dk1"/>
+          </a:effectRef>
+          <a:fontRef idx="minor">
+            <a:schemeClr val="tx1"/>
+          </a:fontRef>
+        </p:style>
+      </p:cxnSp>
+      <p:cxnSp>
+        <p:nvCxnSpPr>
+          <p:cNvPr id="52" name="Gerader Verbinder 20">
+            <a:extLst>
+              <a:ext uri="{FF2B5EF4-FFF2-40B4-BE49-F238E27FC236}">
+                <a16:creationId xmlns:a16="http://schemas.microsoft.com/office/drawing/2014/main" id="{FD80FDAE-B742-4E8D-A9CC-B78F4F0CEF3D}"/>
+              </a:ext>
+            </a:extLst>
+          </p:cNvPr>
+          <p:cNvCxnSpPr>
+            <a:cxnSpLocks/>
+          </p:cNvCxnSpPr>
+          <p:nvPr/>
+        </p:nvCxnSpPr>
+        <p:spPr>
+          <a:xfrm>
+            <a:off x="2913419" y="4405629"/>
+            <a:ext cx="1246939" cy="0"/>
+          </a:xfrm>
+          <a:prstGeom prst="line">
+            <a:avLst/>
+          </a:prstGeom>
+          <a:ln w="28575"/>
+        </p:spPr>
+        <p:style>
+          <a:lnRef idx="1">
+            <a:schemeClr val="dk1"/>
+          </a:lnRef>
+          <a:fillRef idx="0">
+            <a:schemeClr val="dk1"/>
+          </a:fillRef>
+          <a:effectRef idx="0">
+            <a:schemeClr val="dk1"/>
+          </a:effectRef>
+          <a:fontRef idx="minor">
+            <a:schemeClr val="tx1"/>
+          </a:fontRef>
+        </p:style>
+      </p:cxnSp>
+      <p:cxnSp>
+        <p:nvCxnSpPr>
+          <p:cNvPr id="53" name="Gerader Verbinder 17">
+            <a:extLst>
+              <a:ext uri="{FF2B5EF4-FFF2-40B4-BE49-F238E27FC236}">
+                <a16:creationId xmlns:a16="http://schemas.microsoft.com/office/drawing/2014/main" id="{D1FBDE34-CE07-47F4-A5EF-F9E8036831F3}"/>
+              </a:ext>
+            </a:extLst>
+          </p:cNvPr>
+          <p:cNvCxnSpPr>
+            <a:cxnSpLocks/>
+          </p:cNvCxnSpPr>
+          <p:nvPr/>
+        </p:nvCxnSpPr>
+        <p:spPr>
+          <a:xfrm>
+            <a:off x="4740743" y="3846266"/>
+            <a:ext cx="0" cy="1260000"/>
+          </a:xfrm>
+          <a:prstGeom prst="line">
+            <a:avLst/>
+          </a:prstGeom>
+          <a:ln w="28575"/>
+        </p:spPr>
+        <p:style>
+          <a:lnRef idx="1">
+            <a:schemeClr val="dk1"/>
+          </a:lnRef>
+          <a:fillRef idx="0">
+            <a:schemeClr val="dk1"/>
+          </a:fillRef>
+          <a:effectRef idx="0">
+            <a:schemeClr val="dk1"/>
+          </a:effectRef>
+          <a:fontRef idx="minor">
+            <a:schemeClr val="tx1"/>
+          </a:fontRef>
+        </p:style>
+      </p:cxnSp>
+      <p:cxnSp>
+        <p:nvCxnSpPr>
+          <p:cNvPr id="54" name="Gerader Verbinder 18">
+            <a:extLst>
+              <a:ext uri="{FF2B5EF4-FFF2-40B4-BE49-F238E27FC236}">
+                <a16:creationId xmlns:a16="http://schemas.microsoft.com/office/drawing/2014/main" id="{8F35545E-AE6A-40E0-A863-797C20417C19}"/>
+              </a:ext>
+            </a:extLst>
+          </p:cNvPr>
+          <p:cNvCxnSpPr>
+            <a:cxnSpLocks/>
+          </p:cNvCxnSpPr>
+          <p:nvPr/>
+        </p:nvCxnSpPr>
+        <p:spPr>
+          <a:xfrm>
+            <a:off x="5166824" y="3846266"/>
+            <a:ext cx="0" cy="1260000"/>
+          </a:xfrm>
+          <a:prstGeom prst="line">
+            <a:avLst/>
+          </a:prstGeom>
+          <a:ln w="28575"/>
+        </p:spPr>
+        <p:style>
+          <a:lnRef idx="1">
+            <a:schemeClr val="dk1"/>
+          </a:lnRef>
+          <a:fillRef idx="0">
+            <a:schemeClr val="dk1"/>
+          </a:fillRef>
+          <a:effectRef idx="0">
+            <a:schemeClr val="dk1"/>
+          </a:effectRef>
+          <a:fontRef idx="minor">
+            <a:schemeClr val="tx1"/>
+          </a:fontRef>
+        </p:style>
+      </p:cxnSp>
+      <p:cxnSp>
+        <p:nvCxnSpPr>
+          <p:cNvPr id="60" name="Gerader Verbinder 19">
+            <a:extLst>
+              <a:ext uri="{FF2B5EF4-FFF2-40B4-BE49-F238E27FC236}">
+                <a16:creationId xmlns:a16="http://schemas.microsoft.com/office/drawing/2014/main" id="{17512A2F-B632-4CB3-AD17-E803B77A3ED6}"/>
+              </a:ext>
+            </a:extLst>
+          </p:cNvPr>
+          <p:cNvCxnSpPr>
+            <a:cxnSpLocks/>
+          </p:cNvCxnSpPr>
+          <p:nvPr/>
+        </p:nvCxnSpPr>
+        <p:spPr>
+          <a:xfrm>
+            <a:off x="4326787" y="4261158"/>
+            <a:ext cx="1246939" cy="0"/>
+          </a:xfrm>
+          <a:prstGeom prst="line">
+            <a:avLst/>
+          </a:prstGeom>
+          <a:ln w="28575"/>
+        </p:spPr>
+        <p:style>
+          <a:lnRef idx="1">
+            <a:schemeClr val="dk1"/>
+          </a:lnRef>
+          <a:fillRef idx="0">
+            <a:schemeClr val="dk1"/>
+          </a:fillRef>
+          <a:effectRef idx="0">
+            <a:schemeClr val="dk1"/>
+          </a:effectRef>
+          <a:fontRef idx="minor">
+            <a:schemeClr val="tx1"/>
+          </a:fontRef>
+        </p:style>
+      </p:cxnSp>
+      <p:cxnSp>
+        <p:nvCxnSpPr>
+          <p:cNvPr id="61" name="Gerader Verbinder 20">
+            <a:extLst>
+              <a:ext uri="{FF2B5EF4-FFF2-40B4-BE49-F238E27FC236}">
+                <a16:creationId xmlns:a16="http://schemas.microsoft.com/office/drawing/2014/main" id="{4BA97223-329D-42AE-96E3-0DE1824C2244}"/>
+              </a:ext>
+            </a:extLst>
+          </p:cNvPr>
+          <p:cNvCxnSpPr>
+            <a:cxnSpLocks/>
+          </p:cNvCxnSpPr>
+          <p:nvPr/>
+        </p:nvCxnSpPr>
+        <p:spPr>
+          <a:xfrm>
+            <a:off x="4326787" y="4688995"/>
+            <a:ext cx="1246939" cy="0"/>
+          </a:xfrm>
+          <a:prstGeom prst="line">
+            <a:avLst/>
+          </a:prstGeom>
+          <a:ln w="28575"/>
+        </p:spPr>
+        <p:style>
+          <a:lnRef idx="1">
+            <a:schemeClr val="dk1"/>
+          </a:lnRef>
+          <a:fillRef idx="0">
+            <a:schemeClr val="dk1"/>
+          </a:fillRef>
+          <a:effectRef idx="0">
+            <a:schemeClr val="dk1"/>
+          </a:effectRef>
+          <a:fontRef idx="minor">
+            <a:schemeClr val="tx1"/>
+          </a:fontRef>
+        </p:style>
+      </p:cxnSp>
+      <p:cxnSp>
+        <p:nvCxnSpPr>
+          <p:cNvPr id="62" name="Gerader Verbinder 17">
+            <a:extLst>
+              <a:ext uri="{FF2B5EF4-FFF2-40B4-BE49-F238E27FC236}">
+                <a16:creationId xmlns:a16="http://schemas.microsoft.com/office/drawing/2014/main" id="{62D84D06-F4AA-4EDD-BC69-42D581C4732C}"/>
+              </a:ext>
+            </a:extLst>
+          </p:cNvPr>
+          <p:cNvCxnSpPr>
+            <a:cxnSpLocks/>
+          </p:cNvCxnSpPr>
+          <p:nvPr/>
+        </p:nvCxnSpPr>
+        <p:spPr>
+          <a:xfrm>
+            <a:off x="6139181" y="4116015"/>
+            <a:ext cx="0" cy="1260000"/>
+          </a:xfrm>
+          <a:prstGeom prst="line">
+            <a:avLst/>
+          </a:prstGeom>
+          <a:ln w="28575"/>
+        </p:spPr>
+        <p:style>
+          <a:lnRef idx="1">
+            <a:schemeClr val="dk1"/>
+          </a:lnRef>
+          <a:fillRef idx="0">
+            <a:schemeClr val="dk1"/>
+          </a:fillRef>
+          <a:effectRef idx="0">
+            <a:schemeClr val="dk1"/>
+          </a:effectRef>
+          <a:fontRef idx="minor">
+            <a:schemeClr val="tx1"/>
+          </a:fontRef>
+        </p:style>
+      </p:cxnSp>
+      <p:cxnSp>
+        <p:nvCxnSpPr>
+          <p:cNvPr id="64" name="Gerader Verbinder 18">
+            <a:extLst>
+              <a:ext uri="{FF2B5EF4-FFF2-40B4-BE49-F238E27FC236}">
+                <a16:creationId xmlns:a16="http://schemas.microsoft.com/office/drawing/2014/main" id="{F1836907-8610-4062-8320-58042459D7EC}"/>
+              </a:ext>
+            </a:extLst>
+          </p:cNvPr>
+          <p:cNvCxnSpPr>
+            <a:cxnSpLocks/>
+          </p:cNvCxnSpPr>
+          <p:nvPr/>
+        </p:nvCxnSpPr>
+        <p:spPr>
+          <a:xfrm>
+            <a:off x="6565262" y="4116015"/>
+            <a:ext cx="0" cy="1260000"/>
+          </a:xfrm>
+          <a:prstGeom prst="line">
+            <a:avLst/>
+          </a:prstGeom>
+          <a:ln w="28575"/>
+        </p:spPr>
+        <p:style>
+          <a:lnRef idx="1">
+            <a:schemeClr val="dk1"/>
+          </a:lnRef>
+          <a:fillRef idx="0">
+            <a:schemeClr val="dk1"/>
+          </a:fillRef>
+          <a:effectRef idx="0">
+            <a:schemeClr val="dk1"/>
+          </a:effectRef>
+          <a:fontRef idx="minor">
+            <a:schemeClr val="tx1"/>
+          </a:fontRef>
+        </p:style>
+      </p:cxnSp>
+      <p:cxnSp>
+        <p:nvCxnSpPr>
+          <p:cNvPr id="67" name="Gerader Verbinder 19">
+            <a:extLst>
+              <a:ext uri="{FF2B5EF4-FFF2-40B4-BE49-F238E27FC236}">
+                <a16:creationId xmlns:a16="http://schemas.microsoft.com/office/drawing/2014/main" id="{6919B838-6F54-4F6D-B077-89C1BB2A474D}"/>
+              </a:ext>
+            </a:extLst>
+          </p:cNvPr>
+          <p:cNvCxnSpPr>
+            <a:cxnSpLocks/>
+          </p:cNvCxnSpPr>
+          <p:nvPr/>
+        </p:nvCxnSpPr>
+        <p:spPr>
+          <a:xfrm>
+            <a:off x="5725225" y="4530907"/>
+            <a:ext cx="1246939" cy="0"/>
+          </a:xfrm>
+          <a:prstGeom prst="line">
+            <a:avLst/>
+          </a:prstGeom>
+          <a:ln w="28575"/>
+        </p:spPr>
+        <p:style>
+          <a:lnRef idx="1">
+            <a:schemeClr val="dk1"/>
+          </a:lnRef>
+          <a:fillRef idx="0">
+            <a:schemeClr val="dk1"/>
+          </a:fillRef>
+          <a:effectRef idx="0">
+            <a:schemeClr val="dk1"/>
+          </a:effectRef>
+          <a:fontRef idx="minor">
+            <a:schemeClr val="tx1"/>
+          </a:fontRef>
+        </p:style>
+      </p:cxnSp>
+      <p:cxnSp>
+        <p:nvCxnSpPr>
+          <p:cNvPr id="68" name="Gerader Verbinder 20">
+            <a:extLst>
+              <a:ext uri="{FF2B5EF4-FFF2-40B4-BE49-F238E27FC236}">
+                <a16:creationId xmlns:a16="http://schemas.microsoft.com/office/drawing/2014/main" id="{F3658279-DFFA-4B1C-8DAA-DA6FCAA64A44}"/>
+              </a:ext>
+            </a:extLst>
+          </p:cNvPr>
+          <p:cNvCxnSpPr>
+            <a:cxnSpLocks/>
+          </p:cNvCxnSpPr>
+          <p:nvPr/>
+        </p:nvCxnSpPr>
+        <p:spPr>
+          <a:xfrm>
+            <a:off x="5725225" y="4958744"/>
+            <a:ext cx="1246939" cy="0"/>
+          </a:xfrm>
+          <a:prstGeom prst="line">
+            <a:avLst/>
+          </a:prstGeom>
+          <a:ln w="28575"/>
+        </p:spPr>
+        <p:style>
+          <a:lnRef idx="1">
+            <a:schemeClr val="dk1"/>
+          </a:lnRef>
+          <a:fillRef idx="0">
+            <a:schemeClr val="dk1"/>
+          </a:fillRef>
+          <a:effectRef idx="0">
+            <a:schemeClr val="dk1"/>
+          </a:effectRef>
+          <a:fontRef idx="minor">
+            <a:schemeClr val="tx1"/>
+          </a:fontRef>
+        </p:style>
+      </p:cxnSp>
+      <p:cxnSp>
+        <p:nvCxnSpPr>
+          <p:cNvPr id="69" name="Gerader Verbinder 17">
+            <a:extLst>
+              <a:ext uri="{FF2B5EF4-FFF2-40B4-BE49-F238E27FC236}">
+                <a16:creationId xmlns:a16="http://schemas.microsoft.com/office/drawing/2014/main" id="{79D8E291-3BD8-4FDF-9C8F-80065C8C3939}"/>
+              </a:ext>
+            </a:extLst>
+          </p:cNvPr>
+          <p:cNvCxnSpPr>
+            <a:cxnSpLocks/>
+          </p:cNvCxnSpPr>
+          <p:nvPr/>
+        </p:nvCxnSpPr>
+        <p:spPr>
+          <a:xfrm>
+            <a:off x="7565829" y="4391201"/>
+            <a:ext cx="0" cy="1260000"/>
+          </a:xfrm>
+          <a:prstGeom prst="line">
+            <a:avLst/>
+          </a:prstGeom>
+          <a:ln w="28575"/>
+        </p:spPr>
+        <p:style>
+          <a:lnRef idx="1">
+            <a:schemeClr val="dk1"/>
+          </a:lnRef>
+          <a:fillRef idx="0">
+            <a:schemeClr val="dk1"/>
+          </a:fillRef>
+          <a:effectRef idx="0">
+            <a:schemeClr val="dk1"/>
+          </a:effectRef>
+          <a:fontRef idx="minor">
+            <a:schemeClr val="tx1"/>
+          </a:fontRef>
+        </p:style>
+      </p:cxnSp>
+      <p:cxnSp>
+        <p:nvCxnSpPr>
+          <p:cNvPr id="79" name="Gerader Verbinder 18">
+            <a:extLst>
+              <a:ext uri="{FF2B5EF4-FFF2-40B4-BE49-F238E27FC236}">
+                <a16:creationId xmlns:a16="http://schemas.microsoft.com/office/drawing/2014/main" id="{D8AE1C46-6E4C-4B8B-A96E-8FF2CBE14289}"/>
+              </a:ext>
+            </a:extLst>
+          </p:cNvPr>
+          <p:cNvCxnSpPr>
+            <a:cxnSpLocks/>
+          </p:cNvCxnSpPr>
+          <p:nvPr/>
+        </p:nvCxnSpPr>
+        <p:spPr>
+          <a:xfrm>
+            <a:off x="7991910" y="4391201"/>
+            <a:ext cx="0" cy="1260000"/>
+          </a:xfrm>
+          <a:prstGeom prst="line">
+            <a:avLst/>
+          </a:prstGeom>
+          <a:ln w="28575"/>
+        </p:spPr>
+        <p:style>
+          <a:lnRef idx="1">
+            <a:schemeClr val="dk1"/>
+          </a:lnRef>
+          <a:fillRef idx="0">
+            <a:schemeClr val="dk1"/>
+          </a:fillRef>
+          <a:effectRef idx="0">
+            <a:schemeClr val="dk1"/>
+          </a:effectRef>
+          <a:fontRef idx="minor">
+            <a:schemeClr val="tx1"/>
+          </a:fontRef>
+        </p:style>
+      </p:cxnSp>
+      <p:cxnSp>
+        <p:nvCxnSpPr>
+          <p:cNvPr id="80" name="Gerader Verbinder 19">
+            <a:extLst>
+              <a:ext uri="{FF2B5EF4-FFF2-40B4-BE49-F238E27FC236}">
+                <a16:creationId xmlns:a16="http://schemas.microsoft.com/office/drawing/2014/main" id="{834FD95A-486E-49A3-A35C-332D13372B07}"/>
+              </a:ext>
+            </a:extLst>
+          </p:cNvPr>
+          <p:cNvCxnSpPr>
+            <a:cxnSpLocks/>
+          </p:cNvCxnSpPr>
+          <p:nvPr/>
+        </p:nvCxnSpPr>
+        <p:spPr>
+          <a:xfrm>
+            <a:off x="7151873" y="4806093"/>
+            <a:ext cx="1246939" cy="0"/>
+          </a:xfrm>
+          <a:prstGeom prst="line">
+            <a:avLst/>
+          </a:prstGeom>
+          <a:ln w="28575"/>
+        </p:spPr>
+        <p:style>
+          <a:lnRef idx="1">
+            <a:schemeClr val="dk1"/>
+          </a:lnRef>
+          <a:fillRef idx="0">
+            <a:schemeClr val="dk1"/>
+          </a:fillRef>
+          <a:effectRef idx="0">
+            <a:schemeClr val="dk1"/>
+          </a:effectRef>
+          <a:fontRef idx="minor">
+            <a:schemeClr val="tx1"/>
+          </a:fontRef>
+        </p:style>
+      </p:cxnSp>
+      <p:cxnSp>
+        <p:nvCxnSpPr>
+          <p:cNvPr id="81" name="Gerader Verbinder 20">
+            <a:extLst>
+              <a:ext uri="{FF2B5EF4-FFF2-40B4-BE49-F238E27FC236}">
+                <a16:creationId xmlns:a16="http://schemas.microsoft.com/office/drawing/2014/main" id="{AEB13BF8-C6D8-4782-82D6-EAAD059803FE}"/>
+              </a:ext>
+            </a:extLst>
+          </p:cNvPr>
+          <p:cNvCxnSpPr>
+            <a:cxnSpLocks/>
+          </p:cNvCxnSpPr>
+          <p:nvPr/>
+        </p:nvCxnSpPr>
+        <p:spPr>
+          <a:xfrm>
+            <a:off x="7151873" y="5233930"/>
+            <a:ext cx="1246939" cy="0"/>
+          </a:xfrm>
+          <a:prstGeom prst="line">
+            <a:avLst/>
+          </a:prstGeom>
+          <a:ln w="28575"/>
+        </p:spPr>
+        <p:style>
+          <a:lnRef idx="1">
+            <a:schemeClr val="dk1"/>
+          </a:lnRef>
+          <a:fillRef idx="0">
+            <a:schemeClr val="dk1"/>
+          </a:fillRef>
+          <a:effectRef idx="0">
+            <a:schemeClr val="dk1"/>
+          </a:effectRef>
+          <a:fontRef idx="minor">
+            <a:schemeClr val="tx1"/>
+          </a:fontRef>
+        </p:style>
+      </p:cxnSp>
     </p:spTree>
     <p:extLst>
       <p:ext uri="{BB962C8B-B14F-4D97-AF65-F5344CB8AC3E}">
@@ -6662,7 +8460,7 @@
         <p:spPr>
           <a:xfrm>
             <a:off x="681426" y="1186586"/>
-            <a:ext cx="11375042" cy="1815882"/>
+            <a:ext cx="11375042" cy="1785104"/>
           </a:xfrm>
           <a:prstGeom prst="rect">
             <a:avLst/>
@@ -6705,15 +8503,7 @@
             </a:r>
             <a:r>
               <a:rPr lang="en-GB" sz="2200" dirty="0" err="1"/>
-              <a:t>Buchstaben</a:t>
-            </a:r>
-            <a:r>
-              <a:rPr lang="en-GB" sz="2200" dirty="0"/>
-              <a:t> / </a:t>
-            </a:r>
-            <a:r>
-              <a:rPr lang="en-GB" sz="2200" dirty="0" err="1"/>
-              <a:t>Bildern</a:t>
+              <a:t>Zahlen</a:t>
             </a:r>
             <a:r>
               <a:rPr lang="en-GB" sz="2200" dirty="0"/>
@@ -6745,7 +8535,7 @@
             </a:r>
             <a:r>
               <a:rPr lang="en-GB" sz="2200" dirty="0" err="1"/>
-              <a:t>Buchstaben</a:t>
+              <a:t>Zahlen</a:t>
             </a:r>
             <a:r>
               <a:rPr lang="en-GB" sz="2200" dirty="0"/>
@@ -6761,19 +8551,19 @@
             </a:r>
             <a:r>
               <a:rPr lang="en-GB" sz="2200" dirty="0" err="1"/>
-              <a:t>ein</a:t>
-            </a:r>
-            <a:r>
-              <a:rPr lang="en-GB" sz="2200" dirty="0"/>
-              <a:t> “O” und manche </a:t>
+              <a:t>eine</a:t>
+            </a:r>
+            <a:r>
+              <a:rPr lang="en-GB" sz="2200" dirty="0"/>
+              <a:t> “7” und manche </a:t>
             </a:r>
             <a:r>
               <a:rPr lang="en-GB" sz="2200" dirty="0" err="1"/>
-              <a:t>ein</a:t>
-            </a:r>
-            <a:r>
-              <a:rPr lang="en-GB" sz="2200" dirty="0"/>
-              <a:t> “X”. </a:t>
+              <a:t>eine</a:t>
+            </a:r>
+            <a:r>
+              <a:rPr lang="en-GB" sz="2200" dirty="0"/>
+              <a:t> “8”. </a:t>
             </a:r>
             <a:r>
               <a:rPr lang="en-GB" sz="2200" dirty="0" err="1"/>
@@ -6789,15 +8579,39 @@
             </a:r>
             <a:r>
               <a:rPr lang="en-GB" sz="2200" dirty="0"/>
-              <a:t> die </a:t>
+              <a:t> , </a:t>
             </a:r>
             <a:r>
               <a:rPr lang="en-GB" sz="2200" dirty="0" err="1"/>
-              <a:t>Anzahl</a:t>
-            </a:r>
-            <a:r>
-              <a:rPr lang="en-GB" sz="2200" dirty="0"/>
-              <a:t> von “X”.</a:t>
+              <a:t>wie</a:t>
+            </a:r>
+            <a:r>
+              <a:rPr lang="en-GB" sz="2200" dirty="0"/>
+              <a:t> </a:t>
+            </a:r>
+            <a:r>
+              <a:rPr lang="en-GB" sz="2200" dirty="0" err="1"/>
+              <a:t>häufig</a:t>
+            </a:r>
+            <a:r>
+              <a:rPr lang="en-GB" sz="2200" dirty="0"/>
+              <a:t> “7” </a:t>
+            </a:r>
+            <a:r>
+              <a:rPr lang="en-GB" sz="2200" dirty="0" err="1"/>
+              <a:t>aufgetreten</a:t>
+            </a:r>
+            <a:r>
+              <a:rPr lang="en-GB" sz="2200" dirty="0"/>
+              <a:t> </a:t>
+            </a:r>
+            <a:r>
+              <a:rPr lang="en-GB" sz="2200" dirty="0" err="1"/>
+              <a:t>ist</a:t>
+            </a:r>
+            <a:r>
+              <a:rPr lang="en-GB" sz="2200" dirty="0"/>
+              <a:t>.</a:t>
             </a:r>
           </a:p>
           <a:p>
@@ -6813,7 +8627,7 @@
               <a:t> Sie die </a:t>
             </a:r>
             <a:r>
-              <a:rPr lang="en-GB" sz="2400" b="1" dirty="0" err="1"/>
+              <a:rPr lang="en-GB" sz="2200" b="1" dirty="0" err="1"/>
               <a:t>rechte</a:t>
             </a:r>
             <a:r>
@@ -6830,7 +8644,7 @@
             </a:r>
             <a:r>
               <a:rPr lang="en-GB" sz="2200" dirty="0" err="1"/>
-              <a:t>ein</a:t>
+              <a:t>eine</a:t>
             </a:r>
             <a:r>
               <a:rPr lang="en-GB" sz="2200" dirty="0"/>
@@ -6838,7 +8652,7 @@
             </a:r>
             <a:r>
               <a:rPr lang="en-GB" sz="2200" b="1" dirty="0"/>
-              <a:t>“X”</a:t>
+              <a:t>“7”</a:t>
             </a:r>
             <a:r>
               <a:rPr lang="en-GB" sz="2200" dirty="0"/>
@@ -6870,7 +8684,7 @@
             </a:r>
             <a:r>
               <a:rPr lang="en-GB" sz="2200" dirty="0" err="1"/>
-              <a:t>ein</a:t>
+              <a:t>eine</a:t>
             </a:r>
             <a:r>
               <a:rPr lang="en-GB" sz="2200" dirty="0"/>
@@ -6878,7 +8692,11 @@
             </a:r>
             <a:r>
               <a:rPr lang="en-GB" sz="2200" b="1" dirty="0"/>
-              <a:t>“O” </a:t>
+              <a:t>“8”</a:t>
+            </a:r>
+            <a:r>
+              <a:rPr lang="en-GB" sz="2200" dirty="0"/>
+              <a:t> </a:t>
             </a:r>
             <a:r>
               <a:rPr lang="en-GB" sz="2200" dirty="0" err="1"/>
@@ -7081,7 +8899,7 @@
               <a:pPr algn="ctr"/>
               <a:r>
                 <a:rPr lang="en-GB" sz="2500" dirty="0"/>
-                <a:t>O</a:t>
+                <a:t>8</a:t>
               </a:r>
             </a:p>
           </p:txBody>
@@ -7184,7 +9002,7 @@
               <a:pPr algn="ctr"/>
               <a:r>
                 <a:rPr lang="en-GB" sz="2500" dirty="0"/>
-                <a:t>X</a:t>
+                <a:t>7</a:t>
               </a:r>
             </a:p>
           </p:txBody>
@@ -7287,7 +9105,7 @@
               <a:pPr algn="ctr"/>
               <a:r>
                 <a:rPr lang="en-GB" sz="2500" dirty="0"/>
-                <a:t>O</a:t>
+                <a:t>8</a:t>
               </a:r>
             </a:p>
           </p:txBody>
@@ -7390,7 +9208,7 @@
               <a:pPr algn="ctr"/>
               <a:r>
                 <a:rPr lang="en-GB" sz="2500" dirty="0"/>
-                <a:t>O</a:t>
+                <a:t>8</a:t>
               </a:r>
             </a:p>
           </p:txBody>
@@ -7493,7 +9311,7 @@
               <a:pPr algn="ctr"/>
               <a:r>
                 <a:rPr lang="en-GB" sz="2500" dirty="0"/>
-                <a:t>X</a:t>
+                <a:t>7</a:t>
               </a:r>
             </a:p>
           </p:txBody>
@@ -7651,7 +9469,7 @@
               </a:r>
               <a:r>
                 <a:rPr lang="en-GB" sz="2500" dirty="0"/>
-                <a:t> “X” </a:t>
+                <a:t> “7” </a:t>
               </a:r>
               <a:r>
                 <a:rPr lang="en-GB" sz="2500" dirty="0" err="1"/>
@@ -7778,7 +9596,7 @@
           <a:p>
             <a:r>
               <a:rPr lang="en-GB" b="1" dirty="0"/>
-              <a:t>“O” -&gt; links</a:t>
+              <a:t>“8” -&gt; links</a:t>
             </a:r>
           </a:p>
         </p:txBody>
@@ -7813,7 +9631,7 @@
           <a:p>
             <a:r>
               <a:rPr lang="en-GB" b="1" dirty="0"/>
-              <a:t>“O” -&gt; links</a:t>
+              <a:t>“8” -&gt; links</a:t>
             </a:r>
           </a:p>
         </p:txBody>
@@ -7848,7 +9666,7 @@
           <a:p>
             <a:r>
               <a:rPr lang="en-GB" b="1" dirty="0"/>
-              <a:t>“X” -&gt; </a:t>
+              <a:t>“7” -&gt; </a:t>
             </a:r>
             <a:r>
               <a:rPr lang="en-GB" b="1" dirty="0" err="1"/>
@@ -7888,7 +9706,7 @@
           <a:p>
             <a:r>
               <a:rPr lang="en-GB" b="1" dirty="0"/>
-              <a:t>“X” -&gt; </a:t>
+              <a:t>“7” -&gt; </a:t>
             </a:r>
             <a:r>
               <a:rPr lang="en-GB" b="1" dirty="0" err="1"/>
@@ -7928,15 +9746,1025 @@
           <a:p>
             <a:r>
               <a:rPr lang="en-GB" b="1" dirty="0"/>
-              <a:t>“O” -&gt; links</a:t>
+              <a:t>“8” -&gt; links</a:t>
             </a:r>
           </a:p>
         </p:txBody>
       </p:sp>
+      <p:sp>
+        <p:nvSpPr>
+          <p:cNvPr id="31" name="Rechteck 16">
+            <a:extLst>
+              <a:ext uri="{FF2B5EF4-FFF2-40B4-BE49-F238E27FC236}">
+                <a16:creationId xmlns:a16="http://schemas.microsoft.com/office/drawing/2014/main" id="{63CC5F48-A447-4B7F-9541-14E49613F314}"/>
+              </a:ext>
+            </a:extLst>
+          </p:cNvPr>
+          <p:cNvSpPr/>
+          <p:nvPr/>
+        </p:nvSpPr>
+        <p:spPr>
+          <a:xfrm>
+            <a:off x="1490003" y="3287561"/>
+            <a:ext cx="1246939" cy="1260000"/>
+          </a:xfrm>
+          <a:prstGeom prst="rect">
+            <a:avLst/>
+          </a:prstGeom>
+          <a:noFill/>
+          <a:ln w="28575"/>
+        </p:spPr>
+        <p:style>
+          <a:lnRef idx="2">
+            <a:schemeClr val="dk1"/>
+          </a:lnRef>
+          <a:fillRef idx="1">
+            <a:schemeClr val="lt1"/>
+          </a:fillRef>
+          <a:effectRef idx="0">
+            <a:schemeClr val="dk1"/>
+          </a:effectRef>
+          <a:fontRef idx="minor">
+            <a:schemeClr val="dk1"/>
+          </a:fontRef>
+        </p:style>
+        <p:txBody>
+          <a:bodyPr rtlCol="0" anchor="ctr"/>
+          <a:lstStyle/>
+          <a:p>
+            <a:pPr algn="ctr"/>
+            <a:endParaRPr lang="de-DE" dirty="0"/>
+          </a:p>
+        </p:txBody>
+      </p:sp>
+      <p:sp>
+        <p:nvSpPr>
+          <p:cNvPr id="34" name="Rechteck 16">
+            <a:extLst>
+              <a:ext uri="{FF2B5EF4-FFF2-40B4-BE49-F238E27FC236}">
+                <a16:creationId xmlns:a16="http://schemas.microsoft.com/office/drawing/2014/main" id="{C093C49A-6D7D-4EA3-AD58-4C1EE7675310}"/>
+              </a:ext>
+            </a:extLst>
+          </p:cNvPr>
+          <p:cNvSpPr/>
+          <p:nvPr/>
+        </p:nvSpPr>
+        <p:spPr>
+          <a:xfrm>
+            <a:off x="4326787" y="3834233"/>
+            <a:ext cx="1246939" cy="1260000"/>
+          </a:xfrm>
+          <a:prstGeom prst="rect">
+            <a:avLst/>
+          </a:prstGeom>
+          <a:noFill/>
+          <a:ln w="28575"/>
+        </p:spPr>
+        <p:style>
+          <a:lnRef idx="2">
+            <a:schemeClr val="dk1"/>
+          </a:lnRef>
+          <a:fillRef idx="1">
+            <a:schemeClr val="lt1"/>
+          </a:fillRef>
+          <a:effectRef idx="0">
+            <a:schemeClr val="dk1"/>
+          </a:effectRef>
+          <a:fontRef idx="minor">
+            <a:schemeClr val="dk1"/>
+          </a:fontRef>
+        </p:style>
+        <p:txBody>
+          <a:bodyPr rtlCol="0" anchor="ctr"/>
+          <a:lstStyle/>
+          <a:p>
+            <a:pPr algn="ctr"/>
+            <a:endParaRPr lang="de-DE" dirty="0"/>
+          </a:p>
+        </p:txBody>
+      </p:sp>
+      <p:sp>
+        <p:nvSpPr>
+          <p:cNvPr id="37" name="Rechteck 16">
+            <a:extLst>
+              <a:ext uri="{FF2B5EF4-FFF2-40B4-BE49-F238E27FC236}">
+                <a16:creationId xmlns:a16="http://schemas.microsoft.com/office/drawing/2014/main" id="{AD93F5FA-83A9-425A-B82C-28B70E7248C9}"/>
+              </a:ext>
+            </a:extLst>
+          </p:cNvPr>
+          <p:cNvSpPr/>
+          <p:nvPr/>
+        </p:nvSpPr>
+        <p:spPr>
+          <a:xfrm>
+            <a:off x="2908395" y="3560897"/>
+            <a:ext cx="1246939" cy="1260000"/>
+          </a:xfrm>
+          <a:prstGeom prst="rect">
+            <a:avLst/>
+          </a:prstGeom>
+          <a:noFill/>
+          <a:ln w="28575"/>
+        </p:spPr>
+        <p:style>
+          <a:lnRef idx="2">
+            <a:schemeClr val="dk1"/>
+          </a:lnRef>
+          <a:fillRef idx="1">
+            <a:schemeClr val="lt1"/>
+          </a:fillRef>
+          <a:effectRef idx="0">
+            <a:schemeClr val="dk1"/>
+          </a:effectRef>
+          <a:fontRef idx="minor">
+            <a:schemeClr val="dk1"/>
+          </a:fontRef>
+        </p:style>
+        <p:txBody>
+          <a:bodyPr rtlCol="0" anchor="ctr"/>
+          <a:lstStyle/>
+          <a:p>
+            <a:pPr algn="ctr"/>
+            <a:endParaRPr lang="de-DE" dirty="0"/>
+          </a:p>
+        </p:txBody>
+      </p:sp>
+      <p:sp>
+        <p:nvSpPr>
+          <p:cNvPr id="40" name="Rechteck 16">
+            <a:extLst>
+              <a:ext uri="{FF2B5EF4-FFF2-40B4-BE49-F238E27FC236}">
+                <a16:creationId xmlns:a16="http://schemas.microsoft.com/office/drawing/2014/main" id="{10D1B706-C12B-4B94-A226-C2B5A403F12D}"/>
+              </a:ext>
+            </a:extLst>
+          </p:cNvPr>
+          <p:cNvSpPr/>
+          <p:nvPr/>
+        </p:nvSpPr>
+        <p:spPr>
+          <a:xfrm>
+            <a:off x="5745179" y="4107569"/>
+            <a:ext cx="1246939" cy="1260000"/>
+          </a:xfrm>
+          <a:prstGeom prst="rect">
+            <a:avLst/>
+          </a:prstGeom>
+          <a:noFill/>
+          <a:ln w="28575"/>
+        </p:spPr>
+        <p:style>
+          <a:lnRef idx="2">
+            <a:schemeClr val="dk1"/>
+          </a:lnRef>
+          <a:fillRef idx="1">
+            <a:schemeClr val="lt1"/>
+          </a:fillRef>
+          <a:effectRef idx="0">
+            <a:schemeClr val="dk1"/>
+          </a:effectRef>
+          <a:fontRef idx="minor">
+            <a:schemeClr val="dk1"/>
+          </a:fontRef>
+        </p:style>
+        <p:txBody>
+          <a:bodyPr rtlCol="0" anchor="ctr"/>
+          <a:lstStyle/>
+          <a:p>
+            <a:pPr algn="ctr"/>
+            <a:endParaRPr lang="de-DE" dirty="0"/>
+          </a:p>
+        </p:txBody>
+      </p:sp>
+      <p:sp>
+        <p:nvSpPr>
+          <p:cNvPr id="43" name="Rechteck 16">
+            <a:extLst>
+              <a:ext uri="{FF2B5EF4-FFF2-40B4-BE49-F238E27FC236}">
+                <a16:creationId xmlns:a16="http://schemas.microsoft.com/office/drawing/2014/main" id="{9DE201C6-0675-4E37-A346-BDDECFE4E0D0}"/>
+              </a:ext>
+            </a:extLst>
+          </p:cNvPr>
+          <p:cNvSpPr/>
+          <p:nvPr/>
+        </p:nvSpPr>
+        <p:spPr>
+          <a:xfrm>
+            <a:off x="7163572" y="4380906"/>
+            <a:ext cx="1246939" cy="1260000"/>
+          </a:xfrm>
+          <a:prstGeom prst="rect">
+            <a:avLst/>
+          </a:prstGeom>
+          <a:noFill/>
+          <a:ln w="28575"/>
+        </p:spPr>
+        <p:style>
+          <a:lnRef idx="2">
+            <a:schemeClr val="dk1"/>
+          </a:lnRef>
+          <a:fillRef idx="1">
+            <a:schemeClr val="lt1"/>
+          </a:fillRef>
+          <a:effectRef idx="0">
+            <a:schemeClr val="dk1"/>
+          </a:effectRef>
+          <a:fontRef idx="minor">
+            <a:schemeClr val="dk1"/>
+          </a:fontRef>
+        </p:style>
+        <p:txBody>
+          <a:bodyPr rtlCol="0" anchor="ctr"/>
+          <a:lstStyle/>
+          <a:p>
+            <a:pPr algn="ctr"/>
+            <a:endParaRPr lang="de-DE" dirty="0"/>
+          </a:p>
+        </p:txBody>
+      </p:sp>
+      <p:cxnSp>
+        <p:nvCxnSpPr>
+          <p:cNvPr id="45" name="Gerader Verbinder 17">
+            <a:extLst>
+              <a:ext uri="{FF2B5EF4-FFF2-40B4-BE49-F238E27FC236}">
+                <a16:creationId xmlns:a16="http://schemas.microsoft.com/office/drawing/2014/main" id="{8FCC9CA1-2A1F-473A-ADE5-00C316112BEE}"/>
+              </a:ext>
+            </a:extLst>
+          </p:cNvPr>
+          <p:cNvCxnSpPr>
+            <a:cxnSpLocks/>
+          </p:cNvCxnSpPr>
+          <p:nvPr/>
+        </p:nvCxnSpPr>
+        <p:spPr>
+          <a:xfrm>
+            <a:off x="1903959" y="3273286"/>
+            <a:ext cx="0" cy="1260000"/>
+          </a:xfrm>
+          <a:prstGeom prst="line">
+            <a:avLst/>
+          </a:prstGeom>
+          <a:ln w="28575"/>
+        </p:spPr>
+        <p:style>
+          <a:lnRef idx="1">
+            <a:schemeClr val="dk1"/>
+          </a:lnRef>
+          <a:fillRef idx="0">
+            <a:schemeClr val="dk1"/>
+          </a:fillRef>
+          <a:effectRef idx="0">
+            <a:schemeClr val="dk1"/>
+          </a:effectRef>
+          <a:fontRef idx="minor">
+            <a:schemeClr val="tx1"/>
+          </a:fontRef>
+        </p:style>
+      </p:cxnSp>
+      <p:cxnSp>
+        <p:nvCxnSpPr>
+          <p:cNvPr id="46" name="Gerader Verbinder 18">
+            <a:extLst>
+              <a:ext uri="{FF2B5EF4-FFF2-40B4-BE49-F238E27FC236}">
+                <a16:creationId xmlns:a16="http://schemas.microsoft.com/office/drawing/2014/main" id="{258B92B0-D95F-46CA-81A8-BC66D3935E5A}"/>
+              </a:ext>
+            </a:extLst>
+          </p:cNvPr>
+          <p:cNvCxnSpPr>
+            <a:cxnSpLocks/>
+          </p:cNvCxnSpPr>
+          <p:nvPr/>
+        </p:nvCxnSpPr>
+        <p:spPr>
+          <a:xfrm>
+            <a:off x="2330040" y="3273286"/>
+            <a:ext cx="0" cy="1260000"/>
+          </a:xfrm>
+          <a:prstGeom prst="line">
+            <a:avLst/>
+          </a:prstGeom>
+          <a:ln w="28575"/>
+        </p:spPr>
+        <p:style>
+          <a:lnRef idx="1">
+            <a:schemeClr val="dk1"/>
+          </a:lnRef>
+          <a:fillRef idx="0">
+            <a:schemeClr val="dk1"/>
+          </a:fillRef>
+          <a:effectRef idx="0">
+            <a:schemeClr val="dk1"/>
+          </a:effectRef>
+          <a:fontRef idx="minor">
+            <a:schemeClr val="tx1"/>
+          </a:fontRef>
+        </p:style>
+      </p:cxnSp>
+      <p:cxnSp>
+        <p:nvCxnSpPr>
+          <p:cNvPr id="47" name="Gerader Verbinder 19">
+            <a:extLst>
+              <a:ext uri="{FF2B5EF4-FFF2-40B4-BE49-F238E27FC236}">
+                <a16:creationId xmlns:a16="http://schemas.microsoft.com/office/drawing/2014/main" id="{045600C7-ED41-4460-9553-9792720E8CB0}"/>
+              </a:ext>
+            </a:extLst>
+          </p:cNvPr>
+          <p:cNvCxnSpPr>
+            <a:cxnSpLocks/>
+          </p:cNvCxnSpPr>
+          <p:nvPr/>
+        </p:nvCxnSpPr>
+        <p:spPr>
+          <a:xfrm>
+            <a:off x="1490003" y="3688178"/>
+            <a:ext cx="1246939" cy="0"/>
+          </a:xfrm>
+          <a:prstGeom prst="line">
+            <a:avLst/>
+          </a:prstGeom>
+          <a:ln w="28575"/>
+        </p:spPr>
+        <p:style>
+          <a:lnRef idx="1">
+            <a:schemeClr val="dk1"/>
+          </a:lnRef>
+          <a:fillRef idx="0">
+            <a:schemeClr val="dk1"/>
+          </a:fillRef>
+          <a:effectRef idx="0">
+            <a:schemeClr val="dk1"/>
+          </a:effectRef>
+          <a:fontRef idx="minor">
+            <a:schemeClr val="tx1"/>
+          </a:fontRef>
+        </p:style>
+      </p:cxnSp>
+      <p:cxnSp>
+        <p:nvCxnSpPr>
+          <p:cNvPr id="48" name="Gerader Verbinder 20">
+            <a:extLst>
+              <a:ext uri="{FF2B5EF4-FFF2-40B4-BE49-F238E27FC236}">
+                <a16:creationId xmlns:a16="http://schemas.microsoft.com/office/drawing/2014/main" id="{2C45E925-8E83-47BD-9DF1-4AA68713FAE4}"/>
+              </a:ext>
+            </a:extLst>
+          </p:cNvPr>
+          <p:cNvCxnSpPr>
+            <a:cxnSpLocks/>
+          </p:cNvCxnSpPr>
+          <p:nvPr/>
+        </p:nvCxnSpPr>
+        <p:spPr>
+          <a:xfrm>
+            <a:off x="1490003" y="4116015"/>
+            <a:ext cx="1246939" cy="0"/>
+          </a:xfrm>
+          <a:prstGeom prst="line">
+            <a:avLst/>
+          </a:prstGeom>
+          <a:ln w="28575"/>
+        </p:spPr>
+        <p:style>
+          <a:lnRef idx="1">
+            <a:schemeClr val="dk1"/>
+          </a:lnRef>
+          <a:fillRef idx="0">
+            <a:schemeClr val="dk1"/>
+          </a:fillRef>
+          <a:effectRef idx="0">
+            <a:schemeClr val="dk1"/>
+          </a:effectRef>
+          <a:fontRef idx="minor">
+            <a:schemeClr val="tx1"/>
+          </a:fontRef>
+        </p:style>
+      </p:cxnSp>
+      <p:cxnSp>
+        <p:nvCxnSpPr>
+          <p:cNvPr id="49" name="Gerader Verbinder 17">
+            <a:extLst>
+              <a:ext uri="{FF2B5EF4-FFF2-40B4-BE49-F238E27FC236}">
+                <a16:creationId xmlns:a16="http://schemas.microsoft.com/office/drawing/2014/main" id="{0F7F8935-BB9D-4412-8616-932D7613AA41}"/>
+              </a:ext>
+            </a:extLst>
+          </p:cNvPr>
+          <p:cNvCxnSpPr>
+            <a:cxnSpLocks/>
+          </p:cNvCxnSpPr>
+          <p:nvPr/>
+        </p:nvCxnSpPr>
+        <p:spPr>
+          <a:xfrm>
+            <a:off x="3327375" y="3562900"/>
+            <a:ext cx="0" cy="1260000"/>
+          </a:xfrm>
+          <a:prstGeom prst="line">
+            <a:avLst/>
+          </a:prstGeom>
+          <a:ln w="28575"/>
+        </p:spPr>
+        <p:style>
+          <a:lnRef idx="1">
+            <a:schemeClr val="dk1"/>
+          </a:lnRef>
+          <a:fillRef idx="0">
+            <a:schemeClr val="dk1"/>
+          </a:fillRef>
+          <a:effectRef idx="0">
+            <a:schemeClr val="dk1"/>
+          </a:effectRef>
+          <a:fontRef idx="minor">
+            <a:schemeClr val="tx1"/>
+          </a:fontRef>
+        </p:style>
+      </p:cxnSp>
+      <p:cxnSp>
+        <p:nvCxnSpPr>
+          <p:cNvPr id="50" name="Gerader Verbinder 18">
+            <a:extLst>
+              <a:ext uri="{FF2B5EF4-FFF2-40B4-BE49-F238E27FC236}">
+                <a16:creationId xmlns:a16="http://schemas.microsoft.com/office/drawing/2014/main" id="{64362855-CE6C-4038-861E-8C0777B69D4F}"/>
+              </a:ext>
+            </a:extLst>
+          </p:cNvPr>
+          <p:cNvCxnSpPr>
+            <a:cxnSpLocks/>
+          </p:cNvCxnSpPr>
+          <p:nvPr/>
+        </p:nvCxnSpPr>
+        <p:spPr>
+          <a:xfrm>
+            <a:off x="3753456" y="3562900"/>
+            <a:ext cx="0" cy="1260000"/>
+          </a:xfrm>
+          <a:prstGeom prst="line">
+            <a:avLst/>
+          </a:prstGeom>
+          <a:ln w="28575"/>
+        </p:spPr>
+        <p:style>
+          <a:lnRef idx="1">
+            <a:schemeClr val="dk1"/>
+          </a:lnRef>
+          <a:fillRef idx="0">
+            <a:schemeClr val="dk1"/>
+          </a:fillRef>
+          <a:effectRef idx="0">
+            <a:schemeClr val="dk1"/>
+          </a:effectRef>
+          <a:fontRef idx="minor">
+            <a:schemeClr val="tx1"/>
+          </a:fontRef>
+        </p:style>
+      </p:cxnSp>
+      <p:cxnSp>
+        <p:nvCxnSpPr>
+          <p:cNvPr id="51" name="Gerader Verbinder 19">
+            <a:extLst>
+              <a:ext uri="{FF2B5EF4-FFF2-40B4-BE49-F238E27FC236}">
+                <a16:creationId xmlns:a16="http://schemas.microsoft.com/office/drawing/2014/main" id="{62271103-EBA2-4889-BA2D-E926E7239163}"/>
+              </a:ext>
+            </a:extLst>
+          </p:cNvPr>
+          <p:cNvCxnSpPr>
+            <a:cxnSpLocks/>
+          </p:cNvCxnSpPr>
+          <p:nvPr/>
+        </p:nvCxnSpPr>
+        <p:spPr>
+          <a:xfrm>
+            <a:off x="2913419" y="3977792"/>
+            <a:ext cx="1246939" cy="0"/>
+          </a:xfrm>
+          <a:prstGeom prst="line">
+            <a:avLst/>
+          </a:prstGeom>
+          <a:ln w="28575"/>
+        </p:spPr>
+        <p:style>
+          <a:lnRef idx="1">
+            <a:schemeClr val="dk1"/>
+          </a:lnRef>
+          <a:fillRef idx="0">
+            <a:schemeClr val="dk1"/>
+          </a:fillRef>
+          <a:effectRef idx="0">
+            <a:schemeClr val="dk1"/>
+          </a:effectRef>
+          <a:fontRef idx="minor">
+            <a:schemeClr val="tx1"/>
+          </a:fontRef>
+        </p:style>
+      </p:cxnSp>
+      <p:cxnSp>
+        <p:nvCxnSpPr>
+          <p:cNvPr id="52" name="Gerader Verbinder 20">
+            <a:extLst>
+              <a:ext uri="{FF2B5EF4-FFF2-40B4-BE49-F238E27FC236}">
+                <a16:creationId xmlns:a16="http://schemas.microsoft.com/office/drawing/2014/main" id="{FD80FDAE-B742-4E8D-A9CC-B78F4F0CEF3D}"/>
+              </a:ext>
+            </a:extLst>
+          </p:cNvPr>
+          <p:cNvCxnSpPr>
+            <a:cxnSpLocks/>
+          </p:cNvCxnSpPr>
+          <p:nvPr/>
+        </p:nvCxnSpPr>
+        <p:spPr>
+          <a:xfrm>
+            <a:off x="2913419" y="4405629"/>
+            <a:ext cx="1246939" cy="0"/>
+          </a:xfrm>
+          <a:prstGeom prst="line">
+            <a:avLst/>
+          </a:prstGeom>
+          <a:ln w="28575"/>
+        </p:spPr>
+        <p:style>
+          <a:lnRef idx="1">
+            <a:schemeClr val="dk1"/>
+          </a:lnRef>
+          <a:fillRef idx="0">
+            <a:schemeClr val="dk1"/>
+          </a:fillRef>
+          <a:effectRef idx="0">
+            <a:schemeClr val="dk1"/>
+          </a:effectRef>
+          <a:fontRef idx="minor">
+            <a:schemeClr val="tx1"/>
+          </a:fontRef>
+        </p:style>
+      </p:cxnSp>
+      <p:cxnSp>
+        <p:nvCxnSpPr>
+          <p:cNvPr id="53" name="Gerader Verbinder 17">
+            <a:extLst>
+              <a:ext uri="{FF2B5EF4-FFF2-40B4-BE49-F238E27FC236}">
+                <a16:creationId xmlns:a16="http://schemas.microsoft.com/office/drawing/2014/main" id="{D1FBDE34-CE07-47F4-A5EF-F9E8036831F3}"/>
+              </a:ext>
+            </a:extLst>
+          </p:cNvPr>
+          <p:cNvCxnSpPr>
+            <a:cxnSpLocks/>
+          </p:cNvCxnSpPr>
+          <p:nvPr/>
+        </p:nvCxnSpPr>
+        <p:spPr>
+          <a:xfrm>
+            <a:off x="4740743" y="3846266"/>
+            <a:ext cx="0" cy="1260000"/>
+          </a:xfrm>
+          <a:prstGeom prst="line">
+            <a:avLst/>
+          </a:prstGeom>
+          <a:ln w="28575"/>
+        </p:spPr>
+        <p:style>
+          <a:lnRef idx="1">
+            <a:schemeClr val="dk1"/>
+          </a:lnRef>
+          <a:fillRef idx="0">
+            <a:schemeClr val="dk1"/>
+          </a:fillRef>
+          <a:effectRef idx="0">
+            <a:schemeClr val="dk1"/>
+          </a:effectRef>
+          <a:fontRef idx="minor">
+            <a:schemeClr val="tx1"/>
+          </a:fontRef>
+        </p:style>
+      </p:cxnSp>
+      <p:cxnSp>
+        <p:nvCxnSpPr>
+          <p:cNvPr id="54" name="Gerader Verbinder 18">
+            <a:extLst>
+              <a:ext uri="{FF2B5EF4-FFF2-40B4-BE49-F238E27FC236}">
+                <a16:creationId xmlns:a16="http://schemas.microsoft.com/office/drawing/2014/main" id="{8F35545E-AE6A-40E0-A863-797C20417C19}"/>
+              </a:ext>
+            </a:extLst>
+          </p:cNvPr>
+          <p:cNvCxnSpPr>
+            <a:cxnSpLocks/>
+          </p:cNvCxnSpPr>
+          <p:nvPr/>
+        </p:nvCxnSpPr>
+        <p:spPr>
+          <a:xfrm>
+            <a:off x="5166824" y="3846266"/>
+            <a:ext cx="0" cy="1260000"/>
+          </a:xfrm>
+          <a:prstGeom prst="line">
+            <a:avLst/>
+          </a:prstGeom>
+          <a:ln w="28575"/>
+        </p:spPr>
+        <p:style>
+          <a:lnRef idx="1">
+            <a:schemeClr val="dk1"/>
+          </a:lnRef>
+          <a:fillRef idx="0">
+            <a:schemeClr val="dk1"/>
+          </a:fillRef>
+          <a:effectRef idx="0">
+            <a:schemeClr val="dk1"/>
+          </a:effectRef>
+          <a:fontRef idx="minor">
+            <a:schemeClr val="tx1"/>
+          </a:fontRef>
+        </p:style>
+      </p:cxnSp>
+      <p:cxnSp>
+        <p:nvCxnSpPr>
+          <p:cNvPr id="60" name="Gerader Verbinder 19">
+            <a:extLst>
+              <a:ext uri="{FF2B5EF4-FFF2-40B4-BE49-F238E27FC236}">
+                <a16:creationId xmlns:a16="http://schemas.microsoft.com/office/drawing/2014/main" id="{17512A2F-B632-4CB3-AD17-E803B77A3ED6}"/>
+              </a:ext>
+            </a:extLst>
+          </p:cNvPr>
+          <p:cNvCxnSpPr>
+            <a:cxnSpLocks/>
+          </p:cNvCxnSpPr>
+          <p:nvPr/>
+        </p:nvCxnSpPr>
+        <p:spPr>
+          <a:xfrm>
+            <a:off x="4326787" y="4261158"/>
+            <a:ext cx="1246939" cy="0"/>
+          </a:xfrm>
+          <a:prstGeom prst="line">
+            <a:avLst/>
+          </a:prstGeom>
+          <a:ln w="28575"/>
+        </p:spPr>
+        <p:style>
+          <a:lnRef idx="1">
+            <a:schemeClr val="dk1"/>
+          </a:lnRef>
+          <a:fillRef idx="0">
+            <a:schemeClr val="dk1"/>
+          </a:fillRef>
+          <a:effectRef idx="0">
+            <a:schemeClr val="dk1"/>
+          </a:effectRef>
+          <a:fontRef idx="minor">
+            <a:schemeClr val="tx1"/>
+          </a:fontRef>
+        </p:style>
+      </p:cxnSp>
+      <p:cxnSp>
+        <p:nvCxnSpPr>
+          <p:cNvPr id="61" name="Gerader Verbinder 20">
+            <a:extLst>
+              <a:ext uri="{FF2B5EF4-FFF2-40B4-BE49-F238E27FC236}">
+                <a16:creationId xmlns:a16="http://schemas.microsoft.com/office/drawing/2014/main" id="{4BA97223-329D-42AE-96E3-0DE1824C2244}"/>
+              </a:ext>
+            </a:extLst>
+          </p:cNvPr>
+          <p:cNvCxnSpPr>
+            <a:cxnSpLocks/>
+          </p:cNvCxnSpPr>
+          <p:nvPr/>
+        </p:nvCxnSpPr>
+        <p:spPr>
+          <a:xfrm>
+            <a:off x="4326787" y="4688995"/>
+            <a:ext cx="1246939" cy="0"/>
+          </a:xfrm>
+          <a:prstGeom prst="line">
+            <a:avLst/>
+          </a:prstGeom>
+          <a:ln w="28575"/>
+        </p:spPr>
+        <p:style>
+          <a:lnRef idx="1">
+            <a:schemeClr val="dk1"/>
+          </a:lnRef>
+          <a:fillRef idx="0">
+            <a:schemeClr val="dk1"/>
+          </a:fillRef>
+          <a:effectRef idx="0">
+            <a:schemeClr val="dk1"/>
+          </a:effectRef>
+          <a:fontRef idx="minor">
+            <a:schemeClr val="tx1"/>
+          </a:fontRef>
+        </p:style>
+      </p:cxnSp>
+      <p:cxnSp>
+        <p:nvCxnSpPr>
+          <p:cNvPr id="62" name="Gerader Verbinder 17">
+            <a:extLst>
+              <a:ext uri="{FF2B5EF4-FFF2-40B4-BE49-F238E27FC236}">
+                <a16:creationId xmlns:a16="http://schemas.microsoft.com/office/drawing/2014/main" id="{62D84D06-F4AA-4EDD-BC69-42D581C4732C}"/>
+              </a:ext>
+            </a:extLst>
+          </p:cNvPr>
+          <p:cNvCxnSpPr>
+            <a:cxnSpLocks/>
+          </p:cNvCxnSpPr>
+          <p:nvPr/>
+        </p:nvCxnSpPr>
+        <p:spPr>
+          <a:xfrm>
+            <a:off x="6139181" y="4116015"/>
+            <a:ext cx="0" cy="1260000"/>
+          </a:xfrm>
+          <a:prstGeom prst="line">
+            <a:avLst/>
+          </a:prstGeom>
+          <a:ln w="28575"/>
+        </p:spPr>
+        <p:style>
+          <a:lnRef idx="1">
+            <a:schemeClr val="dk1"/>
+          </a:lnRef>
+          <a:fillRef idx="0">
+            <a:schemeClr val="dk1"/>
+          </a:fillRef>
+          <a:effectRef idx="0">
+            <a:schemeClr val="dk1"/>
+          </a:effectRef>
+          <a:fontRef idx="minor">
+            <a:schemeClr val="tx1"/>
+          </a:fontRef>
+        </p:style>
+      </p:cxnSp>
+      <p:cxnSp>
+        <p:nvCxnSpPr>
+          <p:cNvPr id="64" name="Gerader Verbinder 18">
+            <a:extLst>
+              <a:ext uri="{FF2B5EF4-FFF2-40B4-BE49-F238E27FC236}">
+                <a16:creationId xmlns:a16="http://schemas.microsoft.com/office/drawing/2014/main" id="{F1836907-8610-4062-8320-58042459D7EC}"/>
+              </a:ext>
+            </a:extLst>
+          </p:cNvPr>
+          <p:cNvCxnSpPr>
+            <a:cxnSpLocks/>
+          </p:cNvCxnSpPr>
+          <p:nvPr/>
+        </p:nvCxnSpPr>
+        <p:spPr>
+          <a:xfrm>
+            <a:off x="6565262" y="4116015"/>
+            <a:ext cx="0" cy="1260000"/>
+          </a:xfrm>
+          <a:prstGeom prst="line">
+            <a:avLst/>
+          </a:prstGeom>
+          <a:ln w="28575"/>
+        </p:spPr>
+        <p:style>
+          <a:lnRef idx="1">
+            <a:schemeClr val="dk1"/>
+          </a:lnRef>
+          <a:fillRef idx="0">
+            <a:schemeClr val="dk1"/>
+          </a:fillRef>
+          <a:effectRef idx="0">
+            <a:schemeClr val="dk1"/>
+          </a:effectRef>
+          <a:fontRef idx="minor">
+            <a:schemeClr val="tx1"/>
+          </a:fontRef>
+        </p:style>
+      </p:cxnSp>
+      <p:cxnSp>
+        <p:nvCxnSpPr>
+          <p:cNvPr id="67" name="Gerader Verbinder 19">
+            <a:extLst>
+              <a:ext uri="{FF2B5EF4-FFF2-40B4-BE49-F238E27FC236}">
+                <a16:creationId xmlns:a16="http://schemas.microsoft.com/office/drawing/2014/main" id="{6919B838-6F54-4F6D-B077-89C1BB2A474D}"/>
+              </a:ext>
+            </a:extLst>
+          </p:cNvPr>
+          <p:cNvCxnSpPr>
+            <a:cxnSpLocks/>
+          </p:cNvCxnSpPr>
+          <p:nvPr/>
+        </p:nvCxnSpPr>
+        <p:spPr>
+          <a:xfrm>
+            <a:off x="5725225" y="4530907"/>
+            <a:ext cx="1246939" cy="0"/>
+          </a:xfrm>
+          <a:prstGeom prst="line">
+            <a:avLst/>
+          </a:prstGeom>
+          <a:ln w="28575"/>
+        </p:spPr>
+        <p:style>
+          <a:lnRef idx="1">
+            <a:schemeClr val="dk1"/>
+          </a:lnRef>
+          <a:fillRef idx="0">
+            <a:schemeClr val="dk1"/>
+          </a:fillRef>
+          <a:effectRef idx="0">
+            <a:schemeClr val="dk1"/>
+          </a:effectRef>
+          <a:fontRef idx="minor">
+            <a:schemeClr val="tx1"/>
+          </a:fontRef>
+        </p:style>
+      </p:cxnSp>
+      <p:cxnSp>
+        <p:nvCxnSpPr>
+          <p:cNvPr id="68" name="Gerader Verbinder 20">
+            <a:extLst>
+              <a:ext uri="{FF2B5EF4-FFF2-40B4-BE49-F238E27FC236}">
+                <a16:creationId xmlns:a16="http://schemas.microsoft.com/office/drawing/2014/main" id="{F3658279-DFFA-4B1C-8DAA-DA6FCAA64A44}"/>
+              </a:ext>
+            </a:extLst>
+          </p:cNvPr>
+          <p:cNvCxnSpPr>
+            <a:cxnSpLocks/>
+          </p:cNvCxnSpPr>
+          <p:nvPr/>
+        </p:nvCxnSpPr>
+        <p:spPr>
+          <a:xfrm>
+            <a:off x="5725225" y="4958744"/>
+            <a:ext cx="1246939" cy="0"/>
+          </a:xfrm>
+          <a:prstGeom prst="line">
+            <a:avLst/>
+          </a:prstGeom>
+          <a:ln w="28575"/>
+        </p:spPr>
+        <p:style>
+          <a:lnRef idx="1">
+            <a:schemeClr val="dk1"/>
+          </a:lnRef>
+          <a:fillRef idx="0">
+            <a:schemeClr val="dk1"/>
+          </a:fillRef>
+          <a:effectRef idx="0">
+            <a:schemeClr val="dk1"/>
+          </a:effectRef>
+          <a:fontRef idx="minor">
+            <a:schemeClr val="tx1"/>
+          </a:fontRef>
+        </p:style>
+      </p:cxnSp>
+      <p:cxnSp>
+        <p:nvCxnSpPr>
+          <p:cNvPr id="69" name="Gerader Verbinder 17">
+            <a:extLst>
+              <a:ext uri="{FF2B5EF4-FFF2-40B4-BE49-F238E27FC236}">
+                <a16:creationId xmlns:a16="http://schemas.microsoft.com/office/drawing/2014/main" id="{79D8E291-3BD8-4FDF-9C8F-80065C8C3939}"/>
+              </a:ext>
+            </a:extLst>
+          </p:cNvPr>
+          <p:cNvCxnSpPr>
+            <a:cxnSpLocks/>
+          </p:cNvCxnSpPr>
+          <p:nvPr/>
+        </p:nvCxnSpPr>
+        <p:spPr>
+          <a:xfrm>
+            <a:off x="7565829" y="4391201"/>
+            <a:ext cx="0" cy="1260000"/>
+          </a:xfrm>
+          <a:prstGeom prst="line">
+            <a:avLst/>
+          </a:prstGeom>
+          <a:ln w="28575"/>
+        </p:spPr>
+        <p:style>
+          <a:lnRef idx="1">
+            <a:schemeClr val="dk1"/>
+          </a:lnRef>
+          <a:fillRef idx="0">
+            <a:schemeClr val="dk1"/>
+          </a:fillRef>
+          <a:effectRef idx="0">
+            <a:schemeClr val="dk1"/>
+          </a:effectRef>
+          <a:fontRef idx="minor">
+            <a:schemeClr val="tx1"/>
+          </a:fontRef>
+        </p:style>
+      </p:cxnSp>
+      <p:cxnSp>
+        <p:nvCxnSpPr>
+          <p:cNvPr id="79" name="Gerader Verbinder 18">
+            <a:extLst>
+              <a:ext uri="{FF2B5EF4-FFF2-40B4-BE49-F238E27FC236}">
+                <a16:creationId xmlns:a16="http://schemas.microsoft.com/office/drawing/2014/main" id="{D8AE1C46-6E4C-4B8B-A96E-8FF2CBE14289}"/>
+              </a:ext>
+            </a:extLst>
+          </p:cNvPr>
+          <p:cNvCxnSpPr>
+            <a:cxnSpLocks/>
+          </p:cNvCxnSpPr>
+          <p:nvPr/>
+        </p:nvCxnSpPr>
+        <p:spPr>
+          <a:xfrm>
+            <a:off x="7991910" y="4391201"/>
+            <a:ext cx="0" cy="1260000"/>
+          </a:xfrm>
+          <a:prstGeom prst="line">
+            <a:avLst/>
+          </a:prstGeom>
+          <a:ln w="28575"/>
+        </p:spPr>
+        <p:style>
+          <a:lnRef idx="1">
+            <a:schemeClr val="dk1"/>
+          </a:lnRef>
+          <a:fillRef idx="0">
+            <a:schemeClr val="dk1"/>
+          </a:fillRef>
+          <a:effectRef idx="0">
+            <a:schemeClr val="dk1"/>
+          </a:effectRef>
+          <a:fontRef idx="minor">
+            <a:schemeClr val="tx1"/>
+          </a:fontRef>
+        </p:style>
+      </p:cxnSp>
+      <p:cxnSp>
+        <p:nvCxnSpPr>
+          <p:cNvPr id="80" name="Gerader Verbinder 19">
+            <a:extLst>
+              <a:ext uri="{FF2B5EF4-FFF2-40B4-BE49-F238E27FC236}">
+                <a16:creationId xmlns:a16="http://schemas.microsoft.com/office/drawing/2014/main" id="{834FD95A-486E-49A3-A35C-332D13372B07}"/>
+              </a:ext>
+            </a:extLst>
+          </p:cNvPr>
+          <p:cNvCxnSpPr>
+            <a:cxnSpLocks/>
+          </p:cNvCxnSpPr>
+          <p:nvPr/>
+        </p:nvCxnSpPr>
+        <p:spPr>
+          <a:xfrm>
+            <a:off x="7151873" y="4806093"/>
+            <a:ext cx="1246939" cy="0"/>
+          </a:xfrm>
+          <a:prstGeom prst="line">
+            <a:avLst/>
+          </a:prstGeom>
+          <a:ln w="28575"/>
+        </p:spPr>
+        <p:style>
+          <a:lnRef idx="1">
+            <a:schemeClr val="dk1"/>
+          </a:lnRef>
+          <a:fillRef idx="0">
+            <a:schemeClr val="dk1"/>
+          </a:fillRef>
+          <a:effectRef idx="0">
+            <a:schemeClr val="dk1"/>
+          </a:effectRef>
+          <a:fontRef idx="minor">
+            <a:schemeClr val="tx1"/>
+          </a:fontRef>
+        </p:style>
+      </p:cxnSp>
+      <p:cxnSp>
+        <p:nvCxnSpPr>
+          <p:cNvPr id="81" name="Gerader Verbinder 20">
+            <a:extLst>
+              <a:ext uri="{FF2B5EF4-FFF2-40B4-BE49-F238E27FC236}">
+                <a16:creationId xmlns:a16="http://schemas.microsoft.com/office/drawing/2014/main" id="{AEB13BF8-C6D8-4782-82D6-EAAD059803FE}"/>
+              </a:ext>
+            </a:extLst>
+          </p:cNvPr>
+          <p:cNvCxnSpPr>
+            <a:cxnSpLocks/>
+          </p:cNvCxnSpPr>
+          <p:nvPr/>
+        </p:nvCxnSpPr>
+        <p:spPr>
+          <a:xfrm>
+            <a:off x="7151873" y="5233930"/>
+            <a:ext cx="1246939" cy="0"/>
+          </a:xfrm>
+          <a:prstGeom prst="line">
+            <a:avLst/>
+          </a:prstGeom>
+          <a:ln w="28575"/>
+        </p:spPr>
+        <p:style>
+          <a:lnRef idx="1">
+            <a:schemeClr val="dk1"/>
+          </a:lnRef>
+          <a:fillRef idx="0">
+            <a:schemeClr val="dk1"/>
+          </a:fillRef>
+          <a:effectRef idx="0">
+            <a:schemeClr val="dk1"/>
+          </a:effectRef>
+          <a:fontRef idx="minor">
+            <a:schemeClr val="tx1"/>
+          </a:fontRef>
+        </p:style>
+      </p:cxnSp>
     </p:spTree>
     <p:extLst>
       <p:ext uri="{BB962C8B-B14F-4D97-AF65-F5344CB8AC3E}">
-        <p14:creationId xmlns:p14="http://schemas.microsoft.com/office/powerpoint/2010/main" val="2273264778"/>
+        <p14:creationId xmlns:p14="http://schemas.microsoft.com/office/powerpoint/2010/main" val="3434751472"/>
       </p:ext>
     </p:extLst>
   </p:cSld>

</xml_diff>

<commit_message>
inst to 3 and 7
</commit_message>
<xml_diff>
--- a/instructions/instruction_slides.pptx
+++ b/instructions/instruction_slides.pptx
@@ -282,7 +282,7 @@
           <a:p>
             <a:fld id="{720A8C9A-4914-4E30-BB53-2E47D8B0250F}" type="datetimeFigureOut">
               <a:rPr lang="en-GB" smtClean="0"/>
-              <a:t>30/04/2025</a:t>
+              <a:t>23/06/2025</a:t>
             </a:fld>
             <a:endParaRPr lang="en-GB"/>
           </a:p>
@@ -482,7 +482,7 @@
           <a:p>
             <a:fld id="{720A8C9A-4914-4E30-BB53-2E47D8B0250F}" type="datetimeFigureOut">
               <a:rPr lang="en-GB" smtClean="0"/>
-              <a:t>30/04/2025</a:t>
+              <a:t>23/06/2025</a:t>
             </a:fld>
             <a:endParaRPr lang="en-GB"/>
           </a:p>
@@ -692,7 +692,7 @@
           <a:p>
             <a:fld id="{720A8C9A-4914-4E30-BB53-2E47D8B0250F}" type="datetimeFigureOut">
               <a:rPr lang="en-GB" smtClean="0"/>
-              <a:t>30/04/2025</a:t>
+              <a:t>23/06/2025</a:t>
             </a:fld>
             <a:endParaRPr lang="en-GB"/>
           </a:p>
@@ -892,7 +892,7 @@
           <a:p>
             <a:fld id="{720A8C9A-4914-4E30-BB53-2E47D8B0250F}" type="datetimeFigureOut">
               <a:rPr lang="en-GB" smtClean="0"/>
-              <a:t>30/04/2025</a:t>
+              <a:t>23/06/2025</a:t>
             </a:fld>
             <a:endParaRPr lang="en-GB"/>
           </a:p>
@@ -1168,7 +1168,7 @@
           <a:p>
             <a:fld id="{720A8C9A-4914-4E30-BB53-2E47D8B0250F}" type="datetimeFigureOut">
               <a:rPr lang="en-GB" smtClean="0"/>
-              <a:t>30/04/2025</a:t>
+              <a:t>23/06/2025</a:t>
             </a:fld>
             <a:endParaRPr lang="en-GB"/>
           </a:p>
@@ -1436,7 +1436,7 @@
           <a:p>
             <a:fld id="{720A8C9A-4914-4E30-BB53-2E47D8B0250F}" type="datetimeFigureOut">
               <a:rPr lang="en-GB" smtClean="0"/>
-              <a:t>30/04/2025</a:t>
+              <a:t>23/06/2025</a:t>
             </a:fld>
             <a:endParaRPr lang="en-GB"/>
           </a:p>
@@ -1851,7 +1851,7 @@
           <a:p>
             <a:fld id="{720A8C9A-4914-4E30-BB53-2E47D8B0250F}" type="datetimeFigureOut">
               <a:rPr lang="en-GB" smtClean="0"/>
-              <a:t>30/04/2025</a:t>
+              <a:t>23/06/2025</a:t>
             </a:fld>
             <a:endParaRPr lang="en-GB"/>
           </a:p>
@@ -1993,7 +1993,7 @@
           <a:p>
             <a:fld id="{720A8C9A-4914-4E30-BB53-2E47D8B0250F}" type="datetimeFigureOut">
               <a:rPr lang="en-GB" smtClean="0"/>
-              <a:t>30/04/2025</a:t>
+              <a:t>23/06/2025</a:t>
             </a:fld>
             <a:endParaRPr lang="en-GB"/>
           </a:p>
@@ -2106,7 +2106,7 @@
           <a:p>
             <a:fld id="{720A8C9A-4914-4E30-BB53-2E47D8B0250F}" type="datetimeFigureOut">
               <a:rPr lang="en-GB" smtClean="0"/>
-              <a:t>30/04/2025</a:t>
+              <a:t>23/06/2025</a:t>
             </a:fld>
             <a:endParaRPr lang="en-GB"/>
           </a:p>
@@ -2419,7 +2419,7 @@
           <a:p>
             <a:fld id="{720A8C9A-4914-4E30-BB53-2E47D8B0250F}" type="datetimeFigureOut">
               <a:rPr lang="en-GB" smtClean="0"/>
-              <a:t>30/04/2025</a:t>
+              <a:t>23/06/2025</a:t>
             </a:fld>
             <a:endParaRPr lang="en-GB"/>
           </a:p>
@@ -2708,7 +2708,7 @@
           <a:p>
             <a:fld id="{720A8C9A-4914-4E30-BB53-2E47D8B0250F}" type="datetimeFigureOut">
               <a:rPr lang="en-GB" smtClean="0"/>
-              <a:t>30/04/2025</a:t>
+              <a:t>23/06/2025</a:t>
             </a:fld>
             <a:endParaRPr lang="en-GB"/>
           </a:p>
@@ -2951,7 +2951,7 @@
           <a:p>
             <a:fld id="{720A8C9A-4914-4E30-BB53-2E47D8B0250F}" type="datetimeFigureOut">
               <a:rPr lang="en-GB" smtClean="0"/>
-              <a:t>30/04/2025</a:t>
+              <a:t>23/06/2025</a:t>
             </a:fld>
             <a:endParaRPr lang="en-GB"/>
           </a:p>
@@ -4073,7 +4073,7 @@
             </a:r>
             <a:r>
               <a:rPr lang="en-GB" sz="2200" dirty="0"/>
-              <a:t> “8”. </a:t>
+              <a:t> “3”. </a:t>
             </a:r>
             <a:r>
               <a:rPr lang="en-GB" sz="2200" dirty="0" err="1"/>
@@ -4305,7 +4305,7 @@
               <a:pPr algn="ctr"/>
               <a:r>
                 <a:rPr lang="en-GB" sz="2500" dirty="0"/>
-                <a:t>8</a:t>
+                <a:t>3</a:t>
               </a:r>
             </a:p>
           </p:txBody>
@@ -4511,7 +4511,7 @@
               <a:pPr algn="ctr"/>
               <a:r>
                 <a:rPr lang="en-GB" sz="2500" dirty="0"/>
-                <a:t>8</a:t>
+                <a:t>3</a:t>
               </a:r>
             </a:p>
           </p:txBody>
@@ -4614,7 +4614,7 @@
               <a:pPr algn="ctr"/>
               <a:r>
                 <a:rPr lang="en-GB" sz="2500" dirty="0"/>
-                <a:t>8</a:t>
+                <a:t>3</a:t>
               </a:r>
             </a:p>
           </p:txBody>
@@ -6204,7 +6204,7 @@
             </a:r>
             <a:r>
               <a:rPr lang="en-GB" sz="2200" dirty="0"/>
-              <a:t> “8”. </a:t>
+              <a:t> “3”. </a:t>
             </a:r>
             <a:r>
               <a:rPr lang="en-GB" sz="2200" dirty="0" err="1"/>
@@ -6333,7 +6333,7 @@
             </a:r>
             <a:r>
               <a:rPr lang="en-GB" sz="2200" b="1" dirty="0"/>
-              <a:t>“8”</a:t>
+              <a:t>“3”</a:t>
             </a:r>
             <a:r>
               <a:rPr lang="en-GB" sz="2200" dirty="0"/>
@@ -6540,7 +6540,7 @@
               <a:pPr algn="ctr"/>
               <a:r>
                 <a:rPr lang="en-GB" sz="2500" dirty="0"/>
-                <a:t>8</a:t>
+                <a:t>3</a:t>
               </a:r>
             </a:p>
           </p:txBody>
@@ -6746,7 +6746,7 @@
               <a:pPr algn="ctr"/>
               <a:r>
                 <a:rPr lang="en-GB" sz="2500" dirty="0"/>
-                <a:t>8</a:t>
+                <a:t>3</a:t>
               </a:r>
             </a:p>
           </p:txBody>
@@ -6849,7 +6849,7 @@
               <a:pPr algn="ctr"/>
               <a:r>
                 <a:rPr lang="en-GB" sz="2500" dirty="0"/>
-                <a:t>8</a:t>
+                <a:t>3</a:t>
               </a:r>
             </a:p>
           </p:txBody>
@@ -7237,7 +7237,7 @@
           <a:p>
             <a:r>
               <a:rPr lang="en-GB" b="1" dirty="0"/>
-              <a:t>“8” -&gt; </a:t>
+              <a:t>“3” -&gt; </a:t>
             </a:r>
             <a:r>
               <a:rPr lang="en-GB" b="1" dirty="0" err="1"/>
@@ -7277,7 +7277,7 @@
           <a:p>
             <a:r>
               <a:rPr lang="en-GB" b="1" dirty="0"/>
-              <a:t>“8” -&gt; </a:t>
+              <a:t>“3” -&gt; </a:t>
             </a:r>
             <a:r>
               <a:rPr lang="en-GB" b="1" dirty="0" err="1"/>
@@ -7387,7 +7387,7 @@
           <a:p>
             <a:r>
               <a:rPr lang="en-GB" b="1" dirty="0"/>
-              <a:t>“8” -&gt; </a:t>
+              <a:t>“3” -&gt; </a:t>
             </a:r>
             <a:r>
               <a:rPr lang="en-GB" b="1" dirty="0" err="1"/>
@@ -8563,7 +8563,7 @@
             </a:r>
             <a:r>
               <a:rPr lang="en-GB" sz="2200" dirty="0"/>
-              <a:t> “8”. </a:t>
+              <a:t> “3”. </a:t>
             </a:r>
             <a:r>
               <a:rPr lang="en-GB" sz="2200" dirty="0" err="1"/>
@@ -8692,7 +8692,7 @@
             </a:r>
             <a:r>
               <a:rPr lang="en-GB" sz="2200" b="1" dirty="0"/>
-              <a:t>“8”</a:t>
+              <a:t>“3”</a:t>
             </a:r>
             <a:r>
               <a:rPr lang="en-GB" sz="2200" dirty="0"/>
@@ -8899,7 +8899,7 @@
               <a:pPr algn="ctr"/>
               <a:r>
                 <a:rPr lang="en-GB" sz="2500" dirty="0"/>
-                <a:t>8</a:t>
+                <a:t>3</a:t>
               </a:r>
             </a:p>
           </p:txBody>
@@ -9105,7 +9105,7 @@
               <a:pPr algn="ctr"/>
               <a:r>
                 <a:rPr lang="en-GB" sz="2500" dirty="0"/>
-                <a:t>8</a:t>
+                <a:t>3</a:t>
               </a:r>
             </a:p>
           </p:txBody>
@@ -9208,7 +9208,7 @@
               <a:pPr algn="ctr"/>
               <a:r>
                 <a:rPr lang="en-GB" sz="2500" dirty="0"/>
-                <a:t>8</a:t>
+                <a:t>3</a:t>
               </a:r>
             </a:p>
           </p:txBody>
@@ -9596,7 +9596,7 @@
           <a:p>
             <a:r>
               <a:rPr lang="en-GB" b="1" dirty="0"/>
-              <a:t>“8” -&gt; links</a:t>
+              <a:t>“3” -&gt; links</a:t>
             </a:r>
           </a:p>
         </p:txBody>
@@ -9631,7 +9631,7 @@
           <a:p>
             <a:r>
               <a:rPr lang="en-GB" b="1" dirty="0"/>
-              <a:t>“8” -&gt; links</a:t>
+              <a:t>“3” -&gt; links</a:t>
             </a:r>
           </a:p>
         </p:txBody>
@@ -9746,7 +9746,7 @@
           <a:p>
             <a:r>
               <a:rPr lang="en-GB" b="1" dirty="0"/>
-              <a:t>“8” -&gt; links</a:t>
+              <a:t>“3” -&gt; links</a:t>
             </a:r>
           </a:p>
         </p:txBody>

</xml_diff>